<commit_message>
Coordinate descent aggiunto alla presentazione
</commit_message>
<xml_diff>
--- a/Ppt/Optimization.pptx
+++ b/Ppt/Optimization.pptx
@@ -4,6 +4,9 @@
   <p:sldMasterIdLst>
     <p:sldMasterId id="2147483648" r:id="rId1"/>
   </p:sldMasterIdLst>
+  <p:notesMasterIdLst>
+    <p:notesMasterId r:id="rId39"/>
+  </p:notesMasterIdLst>
   <p:sldIdLst>
     <p:sldId id="256" r:id="rId2"/>
     <p:sldId id="262" r:id="rId3"/>
@@ -37,6 +40,11 @@
     <p:sldId id="292" r:id="rId31"/>
     <p:sldId id="293" r:id="rId32"/>
     <p:sldId id="294" r:id="rId33"/>
+    <p:sldId id="296" r:id="rId34"/>
+    <p:sldId id="297" r:id="rId35"/>
+    <p:sldId id="298" r:id="rId36"/>
+    <p:sldId id="299" r:id="rId37"/>
+    <p:sldId id="300" r:id="rId38"/>
   </p:sldIdLst>
   <p:sldSz cx="12192000" cy="6858000"/>
   <p:notesSz cx="12192000" cy="6858000"/>
@@ -62,6 +70,439 @@
     </p:ext>
   </p:extLst>
 </p:presentation>
+</file>
+
+<file path=ppt/notesMasters/notesMaster1.xml><?xml version="1.0" encoding="utf-8"?>
+<p:notesMaster xmlns:a="http://schemas.openxmlformats.org/drawingml/2006/main" xmlns:r="http://schemas.openxmlformats.org/officeDocument/2006/relationships" xmlns:p="http://schemas.openxmlformats.org/presentationml/2006/main">
+  <p:cSld>
+    <p:bg>
+      <p:bgRef idx="1001">
+        <a:schemeClr val="bg1"/>
+      </p:bgRef>
+    </p:bg>
+    <p:spTree>
+      <p:nvGrpSpPr>
+        <p:cNvPr id="1" name=""/>
+        <p:cNvGrpSpPr/>
+        <p:nvPr/>
+      </p:nvGrpSpPr>
+      <p:grpSpPr>
+        <a:xfrm>
+          <a:off x="0" y="0"/>
+          <a:ext cx="0" cy="0"/>
+          <a:chOff x="0" y="0"/>
+          <a:chExt cx="0" cy="0"/>
+        </a:xfrm>
+      </p:grpSpPr>
+      <p:sp>
+        <p:nvSpPr>
+          <p:cNvPr id="2" name="Segnaposto intestazione 1"/>
+          <p:cNvSpPr>
+            <a:spLocks noGrp="1"/>
+          </p:cNvSpPr>
+          <p:nvPr>
+            <p:ph type="hdr" sz="quarter"/>
+          </p:nvPr>
+        </p:nvSpPr>
+        <p:spPr>
+          <a:xfrm>
+            <a:off x="0" y="0"/>
+            <a:ext cx="5283200" cy="344488"/>
+          </a:xfrm>
+          <a:prstGeom prst="rect">
+            <a:avLst/>
+          </a:prstGeom>
+        </p:spPr>
+        <p:txBody>
+          <a:bodyPr vert="horz" lIns="91440" tIns="45720" rIns="91440" bIns="45720" rtlCol="0"/>
+          <a:lstStyle>
+            <a:lvl1pPr algn="l">
+              <a:defRPr sz="1200"/>
+            </a:lvl1pPr>
+          </a:lstStyle>
+          <a:p>
+            <a:endParaRPr lang="it-IT"/>
+          </a:p>
+        </p:txBody>
+      </p:sp>
+      <p:sp>
+        <p:nvSpPr>
+          <p:cNvPr id="3" name="Segnaposto data 2"/>
+          <p:cNvSpPr>
+            <a:spLocks noGrp="1"/>
+          </p:cNvSpPr>
+          <p:nvPr>
+            <p:ph type="dt" idx="1"/>
+          </p:nvPr>
+        </p:nvSpPr>
+        <p:spPr>
+          <a:xfrm>
+            <a:off x="6905625" y="0"/>
+            <a:ext cx="5283200" cy="344488"/>
+          </a:xfrm>
+          <a:prstGeom prst="rect">
+            <a:avLst/>
+          </a:prstGeom>
+        </p:spPr>
+        <p:txBody>
+          <a:bodyPr vert="horz" lIns="91440" tIns="45720" rIns="91440" bIns="45720" rtlCol="0"/>
+          <a:lstStyle>
+            <a:lvl1pPr algn="r">
+              <a:defRPr sz="1200"/>
+            </a:lvl1pPr>
+          </a:lstStyle>
+          <a:p>
+            <a:fld id="{52CF3C78-BFF9-4137-8833-13E3D0B09D8B}" type="datetimeFigureOut">
+              <a:rPr lang="it-IT" smtClean="0"/>
+              <a:t>14/06/2025</a:t>
+            </a:fld>
+            <a:endParaRPr lang="it-IT"/>
+          </a:p>
+        </p:txBody>
+      </p:sp>
+      <p:sp>
+        <p:nvSpPr>
+          <p:cNvPr id="4" name="Segnaposto immagine diapositiva 3"/>
+          <p:cNvSpPr>
+            <a:spLocks noGrp="1" noRot="1" noChangeAspect="1"/>
+          </p:cNvSpPr>
+          <p:nvPr>
+            <p:ph type="sldImg" idx="2"/>
+          </p:nvPr>
+        </p:nvSpPr>
+        <p:spPr>
+          <a:xfrm>
+            <a:off x="4038600" y="857250"/>
+            <a:ext cx="4114800" cy="2314575"/>
+          </a:xfrm>
+          <a:prstGeom prst="rect">
+            <a:avLst/>
+          </a:prstGeom>
+          <a:noFill/>
+          <a:ln w="12700">
+            <a:solidFill>
+              <a:prstClr val="black"/>
+            </a:solidFill>
+          </a:ln>
+        </p:spPr>
+        <p:txBody>
+          <a:bodyPr vert="horz" lIns="91440" tIns="45720" rIns="91440" bIns="45720" rtlCol="0" anchor="ctr"/>
+          <a:lstStyle/>
+          <a:p>
+            <a:endParaRPr lang="it-IT"/>
+          </a:p>
+        </p:txBody>
+      </p:sp>
+      <p:sp>
+        <p:nvSpPr>
+          <p:cNvPr id="5" name="Segnaposto note 4"/>
+          <p:cNvSpPr>
+            <a:spLocks noGrp="1"/>
+          </p:cNvSpPr>
+          <p:nvPr>
+            <p:ph type="body" sz="quarter" idx="3"/>
+          </p:nvPr>
+        </p:nvSpPr>
+        <p:spPr>
+          <a:xfrm>
+            <a:off x="1219200" y="3300413"/>
+            <a:ext cx="9753600" cy="2700337"/>
+          </a:xfrm>
+          <a:prstGeom prst="rect">
+            <a:avLst/>
+          </a:prstGeom>
+        </p:spPr>
+        <p:txBody>
+          <a:bodyPr vert="horz" lIns="91440" tIns="45720" rIns="91440" bIns="45720" rtlCol="0"/>
+          <a:lstStyle/>
+          <a:p>
+            <a:pPr lvl="0"/>
+            <a:r>
+              <a:rPr lang="it-IT"/>
+              <a:t>Fare clic per modificare gli stili del testo dello schema</a:t>
+            </a:r>
+          </a:p>
+          <a:p>
+            <a:pPr lvl="1"/>
+            <a:r>
+              <a:rPr lang="it-IT"/>
+              <a:t>Secondo livello</a:t>
+            </a:r>
+          </a:p>
+          <a:p>
+            <a:pPr lvl="2"/>
+            <a:r>
+              <a:rPr lang="it-IT"/>
+              <a:t>Terzo livello</a:t>
+            </a:r>
+          </a:p>
+          <a:p>
+            <a:pPr lvl="3"/>
+            <a:r>
+              <a:rPr lang="it-IT"/>
+              <a:t>Quarto livello</a:t>
+            </a:r>
+          </a:p>
+          <a:p>
+            <a:pPr lvl="4"/>
+            <a:r>
+              <a:rPr lang="it-IT"/>
+              <a:t>Quinto livello</a:t>
+            </a:r>
+          </a:p>
+        </p:txBody>
+      </p:sp>
+      <p:sp>
+        <p:nvSpPr>
+          <p:cNvPr id="6" name="Segnaposto piè di pagina 5"/>
+          <p:cNvSpPr>
+            <a:spLocks noGrp="1"/>
+          </p:cNvSpPr>
+          <p:nvPr>
+            <p:ph type="ftr" sz="quarter" idx="4"/>
+          </p:nvPr>
+        </p:nvSpPr>
+        <p:spPr>
+          <a:xfrm>
+            <a:off x="0" y="6513513"/>
+            <a:ext cx="5283200" cy="344487"/>
+          </a:xfrm>
+          <a:prstGeom prst="rect">
+            <a:avLst/>
+          </a:prstGeom>
+        </p:spPr>
+        <p:txBody>
+          <a:bodyPr vert="horz" lIns="91440" tIns="45720" rIns="91440" bIns="45720" rtlCol="0" anchor="b"/>
+          <a:lstStyle>
+            <a:lvl1pPr algn="l">
+              <a:defRPr sz="1200"/>
+            </a:lvl1pPr>
+          </a:lstStyle>
+          <a:p>
+            <a:endParaRPr lang="it-IT"/>
+          </a:p>
+        </p:txBody>
+      </p:sp>
+      <p:sp>
+        <p:nvSpPr>
+          <p:cNvPr id="7" name="Segnaposto numero diapositiva 6"/>
+          <p:cNvSpPr>
+            <a:spLocks noGrp="1"/>
+          </p:cNvSpPr>
+          <p:nvPr>
+            <p:ph type="sldNum" sz="quarter" idx="5"/>
+          </p:nvPr>
+        </p:nvSpPr>
+        <p:spPr>
+          <a:xfrm>
+            <a:off x="6905625" y="6513513"/>
+            <a:ext cx="5283200" cy="344487"/>
+          </a:xfrm>
+          <a:prstGeom prst="rect">
+            <a:avLst/>
+          </a:prstGeom>
+        </p:spPr>
+        <p:txBody>
+          <a:bodyPr vert="horz" lIns="91440" tIns="45720" rIns="91440" bIns="45720" rtlCol="0" anchor="b"/>
+          <a:lstStyle>
+            <a:lvl1pPr algn="r">
+              <a:defRPr sz="1200"/>
+            </a:lvl1pPr>
+          </a:lstStyle>
+          <a:p>
+            <a:fld id="{6218F9A5-25D9-4BE4-92E4-0A5AF102D313}" type="slidenum">
+              <a:rPr lang="it-IT" smtClean="0"/>
+              <a:t>‹N›</a:t>
+            </a:fld>
+            <a:endParaRPr lang="it-IT"/>
+          </a:p>
+        </p:txBody>
+      </p:sp>
+    </p:spTree>
+    <p:extLst>
+      <p:ext uri="{BB962C8B-B14F-4D97-AF65-F5344CB8AC3E}">
+        <p14:creationId xmlns:p14="http://schemas.microsoft.com/office/powerpoint/2010/main" val="3669277591"/>
+      </p:ext>
+    </p:extLst>
+  </p:cSld>
+  <p:clrMap bg1="lt1" tx1="dk1" bg2="lt2" tx2="dk2" accent1="accent1" accent2="accent2" accent3="accent3" accent4="accent4" accent5="accent5" accent6="accent6" hlink="hlink" folHlink="folHlink"/>
+  <p:notesStyle>
+    <a:lvl1pPr marL="0" algn="l" defTabSz="914400" rtl="0" eaLnBrk="1" latinLnBrk="0" hangingPunct="1">
+      <a:defRPr sz="1200" kern="1200">
+        <a:solidFill>
+          <a:schemeClr val="tx1"/>
+        </a:solidFill>
+        <a:latin typeface="+mn-lt"/>
+        <a:ea typeface="+mn-ea"/>
+        <a:cs typeface="+mn-cs"/>
+      </a:defRPr>
+    </a:lvl1pPr>
+    <a:lvl2pPr marL="457200" algn="l" defTabSz="914400" rtl="0" eaLnBrk="1" latinLnBrk="0" hangingPunct="1">
+      <a:defRPr sz="1200" kern="1200">
+        <a:solidFill>
+          <a:schemeClr val="tx1"/>
+        </a:solidFill>
+        <a:latin typeface="+mn-lt"/>
+        <a:ea typeface="+mn-ea"/>
+        <a:cs typeface="+mn-cs"/>
+      </a:defRPr>
+    </a:lvl2pPr>
+    <a:lvl3pPr marL="914400" algn="l" defTabSz="914400" rtl="0" eaLnBrk="1" latinLnBrk="0" hangingPunct="1">
+      <a:defRPr sz="1200" kern="1200">
+        <a:solidFill>
+          <a:schemeClr val="tx1"/>
+        </a:solidFill>
+        <a:latin typeface="+mn-lt"/>
+        <a:ea typeface="+mn-ea"/>
+        <a:cs typeface="+mn-cs"/>
+      </a:defRPr>
+    </a:lvl3pPr>
+    <a:lvl4pPr marL="1371600" algn="l" defTabSz="914400" rtl="0" eaLnBrk="1" latinLnBrk="0" hangingPunct="1">
+      <a:defRPr sz="1200" kern="1200">
+        <a:solidFill>
+          <a:schemeClr val="tx1"/>
+        </a:solidFill>
+        <a:latin typeface="+mn-lt"/>
+        <a:ea typeface="+mn-ea"/>
+        <a:cs typeface="+mn-cs"/>
+      </a:defRPr>
+    </a:lvl4pPr>
+    <a:lvl5pPr marL="1828800" algn="l" defTabSz="914400" rtl="0" eaLnBrk="1" latinLnBrk="0" hangingPunct="1">
+      <a:defRPr sz="1200" kern="1200">
+        <a:solidFill>
+          <a:schemeClr val="tx1"/>
+        </a:solidFill>
+        <a:latin typeface="+mn-lt"/>
+        <a:ea typeface="+mn-ea"/>
+        <a:cs typeface="+mn-cs"/>
+      </a:defRPr>
+    </a:lvl5pPr>
+    <a:lvl6pPr marL="2286000" algn="l" defTabSz="914400" rtl="0" eaLnBrk="1" latinLnBrk="0" hangingPunct="1">
+      <a:defRPr sz="1200" kern="1200">
+        <a:solidFill>
+          <a:schemeClr val="tx1"/>
+        </a:solidFill>
+        <a:latin typeface="+mn-lt"/>
+        <a:ea typeface="+mn-ea"/>
+        <a:cs typeface="+mn-cs"/>
+      </a:defRPr>
+    </a:lvl6pPr>
+    <a:lvl7pPr marL="2743200" algn="l" defTabSz="914400" rtl="0" eaLnBrk="1" latinLnBrk="0" hangingPunct="1">
+      <a:defRPr sz="1200" kern="1200">
+        <a:solidFill>
+          <a:schemeClr val="tx1"/>
+        </a:solidFill>
+        <a:latin typeface="+mn-lt"/>
+        <a:ea typeface="+mn-ea"/>
+        <a:cs typeface="+mn-cs"/>
+      </a:defRPr>
+    </a:lvl7pPr>
+    <a:lvl8pPr marL="3200400" algn="l" defTabSz="914400" rtl="0" eaLnBrk="1" latinLnBrk="0" hangingPunct="1">
+      <a:defRPr sz="1200" kern="1200">
+        <a:solidFill>
+          <a:schemeClr val="tx1"/>
+        </a:solidFill>
+        <a:latin typeface="+mn-lt"/>
+        <a:ea typeface="+mn-ea"/>
+        <a:cs typeface="+mn-cs"/>
+      </a:defRPr>
+    </a:lvl8pPr>
+    <a:lvl9pPr marL="3657600" algn="l" defTabSz="914400" rtl="0" eaLnBrk="1" latinLnBrk="0" hangingPunct="1">
+      <a:defRPr sz="1200" kern="1200">
+        <a:solidFill>
+          <a:schemeClr val="tx1"/>
+        </a:solidFill>
+        <a:latin typeface="+mn-lt"/>
+        <a:ea typeface="+mn-ea"/>
+        <a:cs typeface="+mn-cs"/>
+      </a:defRPr>
+    </a:lvl9pPr>
+  </p:notesStyle>
+</p:notesMaster>
+</file>
+
+<file path=ppt/notesSlides/notesSlide1.xml><?xml version="1.0" encoding="utf-8"?>
+<p:notes xmlns:a="http://schemas.openxmlformats.org/drawingml/2006/main" xmlns:r="http://schemas.openxmlformats.org/officeDocument/2006/relationships" xmlns:p="http://schemas.openxmlformats.org/presentationml/2006/main">
+  <p:cSld>
+    <p:spTree>
+      <p:nvGrpSpPr>
+        <p:cNvPr id="1" name=""/>
+        <p:cNvGrpSpPr/>
+        <p:nvPr/>
+      </p:nvGrpSpPr>
+      <p:grpSpPr>
+        <a:xfrm>
+          <a:off x="0" y="0"/>
+          <a:ext cx="0" cy="0"/>
+          <a:chOff x="0" y="0"/>
+          <a:chExt cx="0" cy="0"/>
+        </a:xfrm>
+      </p:grpSpPr>
+      <p:sp>
+        <p:nvSpPr>
+          <p:cNvPr id="2" name="Segnaposto immagine diapositiva 1"/>
+          <p:cNvSpPr>
+            <a:spLocks noGrp="1" noRot="1" noChangeAspect="1"/>
+          </p:cNvSpPr>
+          <p:nvPr>
+            <p:ph type="sldImg"/>
+          </p:nvPr>
+        </p:nvSpPr>
+        <p:spPr/>
+      </p:sp>
+      <p:sp>
+        <p:nvSpPr>
+          <p:cNvPr id="3" name="Segnaposto note 2"/>
+          <p:cNvSpPr>
+            <a:spLocks noGrp="1"/>
+          </p:cNvSpPr>
+          <p:nvPr>
+            <p:ph type="body" idx="1"/>
+          </p:nvPr>
+        </p:nvSpPr>
+        <p:spPr/>
+        <p:txBody>
+          <a:bodyPr/>
+          <a:lstStyle/>
+          <a:p>
+            <a:endParaRPr lang="it-IT" dirty="0"/>
+          </a:p>
+        </p:txBody>
+      </p:sp>
+      <p:sp>
+        <p:nvSpPr>
+          <p:cNvPr id="4" name="Segnaposto numero diapositiva 3"/>
+          <p:cNvSpPr>
+            <a:spLocks noGrp="1"/>
+          </p:cNvSpPr>
+          <p:nvPr>
+            <p:ph type="sldNum" sz="quarter" idx="5"/>
+          </p:nvPr>
+        </p:nvSpPr>
+        <p:spPr/>
+        <p:txBody>
+          <a:bodyPr/>
+          <a:lstStyle/>
+          <a:p>
+            <a:fld id="{6218F9A5-25D9-4BE4-92E4-0A5AF102D313}" type="slidenum">
+              <a:rPr lang="it-IT" smtClean="0"/>
+              <a:t>37</a:t>
+            </a:fld>
+            <a:endParaRPr lang="it-IT"/>
+          </a:p>
+        </p:txBody>
+      </p:sp>
+    </p:spTree>
+    <p:extLst>
+      <p:ext uri="{BB962C8B-B14F-4D97-AF65-F5344CB8AC3E}">
+        <p14:creationId xmlns:p14="http://schemas.microsoft.com/office/powerpoint/2010/main" val="898911774"/>
+      </p:ext>
+    </p:extLst>
+  </p:cSld>
+  <p:clrMapOvr>
+    <a:masterClrMapping/>
+  </p:clrMapOvr>
+</p:notes>
 </file>
 
 <file path=ppt/slideLayouts/slideLayout1.xml><?xml version="1.0" encoding="utf-8"?>
@@ -2883,8 +3324,8 @@
           </a:p>
         </p:txBody>
       </p:sp>
-      <mc:AlternateContent xmlns:mc="http://schemas.openxmlformats.org/markup-compatibility/2006">
-        <mc:Choice xmlns:a14="http://schemas.microsoft.com/office/drawing/2010/main" Requires="a14">
+      <mc:AlternateContent xmlns:mc="http://schemas.openxmlformats.org/markup-compatibility/2006" xmlns:a14="http://schemas.microsoft.com/office/drawing/2010/main">
+        <mc:Choice Requires="a14">
           <p:sp>
             <p:nvSpPr>
               <p:cNvPr id="4" name="CasellaDiTesto 3">
@@ -3198,7 +3639,7 @@
             </p:txBody>
           </p:sp>
         </mc:Choice>
-        <mc:Fallback>
+        <mc:Fallback xmlns="">
           <p:sp>
             <p:nvSpPr>
               <p:cNvPr id="4" name="CasellaDiTesto 3">
@@ -3243,8 +3684,8 @@
           </p:sp>
         </mc:Fallback>
       </mc:AlternateContent>
-      <mc:AlternateContent xmlns:mc="http://schemas.openxmlformats.org/markup-compatibility/2006">
-        <mc:Choice xmlns:a14="http://schemas.microsoft.com/office/drawing/2010/main" Requires="a14">
+      <mc:AlternateContent xmlns:mc="http://schemas.openxmlformats.org/markup-compatibility/2006" xmlns:a14="http://schemas.microsoft.com/office/drawing/2010/main">
+        <mc:Choice Requires="a14">
           <p:sp>
             <p:nvSpPr>
               <p:cNvPr id="2" name="CasellaDiTesto 1">
@@ -3390,7 +3831,7 @@
             </p:txBody>
           </p:sp>
         </mc:Choice>
-        <mc:Fallback>
+        <mc:Fallback xmlns="">
           <p:sp>
             <p:nvSpPr>
               <p:cNvPr id="2" name="CasellaDiTesto 1">
@@ -3733,8 +4174,8 @@
           </a:p>
         </p:txBody>
       </p:sp>
-      <mc:AlternateContent xmlns:mc="http://schemas.openxmlformats.org/markup-compatibility/2006">
-        <mc:Choice xmlns:a14="http://schemas.microsoft.com/office/drawing/2010/main" Requires="a14">
+      <mc:AlternateContent xmlns:mc="http://schemas.openxmlformats.org/markup-compatibility/2006" xmlns:a14="http://schemas.microsoft.com/office/drawing/2010/main">
+        <mc:Choice Requires="a14">
           <p:sp>
             <p:nvSpPr>
               <p:cNvPr id="2" name="CasellaDiTesto 1">
@@ -3927,7 +4368,7 @@
             </p:txBody>
           </p:sp>
         </mc:Choice>
-        <mc:Fallback>
+        <mc:Fallback xmlns="">
           <p:sp>
             <p:nvSpPr>
               <p:cNvPr id="2" name="CasellaDiTesto 1">
@@ -4043,8 +4484,8 @@
           </a:p>
         </p:txBody>
       </p:sp>
-      <mc:AlternateContent xmlns:mc="http://schemas.openxmlformats.org/markup-compatibility/2006">
-        <mc:Choice xmlns:a14="http://schemas.microsoft.com/office/drawing/2010/main" Requires="a14">
+      <mc:AlternateContent xmlns:mc="http://schemas.openxmlformats.org/markup-compatibility/2006" xmlns:a14="http://schemas.microsoft.com/office/drawing/2010/main">
+        <mc:Choice Requires="a14">
           <p:sp>
             <p:nvSpPr>
               <p:cNvPr id="4" name="CasellaDiTesto 3">
@@ -4117,7 +4558,7 @@
             </p:txBody>
           </p:sp>
         </mc:Choice>
-        <mc:Fallback>
+        <mc:Fallback xmlns="">
           <p:sp>
             <p:nvSpPr>
               <p:cNvPr id="4" name="CasellaDiTesto 3">
@@ -4162,8 +4603,8 @@
           </p:sp>
         </mc:Fallback>
       </mc:AlternateContent>
-      <mc:AlternateContent xmlns:mc="http://schemas.openxmlformats.org/markup-compatibility/2006">
-        <mc:Choice xmlns:a14="http://schemas.microsoft.com/office/drawing/2010/main" Requires="a14">
+      <mc:AlternateContent xmlns:mc="http://schemas.openxmlformats.org/markup-compatibility/2006" xmlns:a14="http://schemas.microsoft.com/office/drawing/2010/main">
+        <mc:Choice Requires="a14">
           <p:sp>
             <p:nvSpPr>
               <p:cNvPr id="6" name="CasellaDiTesto 5">
@@ -4243,7 +4684,7 @@
             </p:txBody>
           </p:sp>
         </mc:Choice>
-        <mc:Fallback>
+        <mc:Fallback xmlns="">
           <p:sp>
             <p:nvSpPr>
               <p:cNvPr id="6" name="CasellaDiTesto 5">
@@ -4288,8 +4729,8 @@
           </p:sp>
         </mc:Fallback>
       </mc:AlternateContent>
-      <mc:AlternateContent xmlns:mc="http://schemas.openxmlformats.org/markup-compatibility/2006">
-        <mc:Choice xmlns:a14="http://schemas.microsoft.com/office/drawing/2010/main" Requires="a14">
+      <mc:AlternateContent xmlns:mc="http://schemas.openxmlformats.org/markup-compatibility/2006" xmlns:a14="http://schemas.microsoft.com/office/drawing/2010/main">
+        <mc:Choice Requires="a14">
           <p:sp>
             <p:nvSpPr>
               <p:cNvPr id="7" name="CasellaDiTesto 6">
@@ -4385,7 +4826,7 @@
             </p:txBody>
           </p:sp>
         </mc:Choice>
-        <mc:Fallback>
+        <mc:Fallback xmlns="">
           <p:sp>
             <p:nvSpPr>
               <p:cNvPr id="7" name="CasellaDiTesto 6">
@@ -4912,7 +5353,7 @@
                 <a:latin typeface="Arial" panose="020B0604020202020204" pitchFamily="34" charset="0"/>
                 <a:cs typeface="Arial" panose="020B0604020202020204" pitchFamily="34" charset="0"/>
               </a:rPr>
-              <a:t>We wanted to evaluate how Stochastic Gradient Descent methods compare to core GD methods in reaching the optimum convergence.</a:t>
+              <a:t>We wanted to evaluate how Stochastic Gradient Descent methods compare to GD methods in reaching the optimum convergence.</a:t>
             </a:r>
           </a:p>
           <a:p>
@@ -5003,8 +5444,8 @@
           </a:p>
         </p:txBody>
       </p:sp>
-      <mc:AlternateContent xmlns:mc="http://schemas.openxmlformats.org/markup-compatibility/2006">
-        <mc:Choice xmlns:a14="http://schemas.microsoft.com/office/drawing/2010/main" Requires="a14">
+      <mc:AlternateContent xmlns:mc="http://schemas.openxmlformats.org/markup-compatibility/2006" xmlns:a14="http://schemas.microsoft.com/office/drawing/2010/main">
+        <mc:Choice Requires="a14">
           <p:sp>
             <p:nvSpPr>
               <p:cNvPr id="2" name="CasellaDiTesto 1">
@@ -5080,7 +5521,7 @@
             </p:txBody>
           </p:sp>
         </mc:Choice>
-        <mc:Fallback>
+        <mc:Fallback xmlns="">
           <p:sp>
             <p:nvSpPr>
               <p:cNvPr id="2" name="CasellaDiTesto 1">
@@ -5125,8 +5566,8 @@
           </p:sp>
         </mc:Fallback>
       </mc:AlternateContent>
-      <mc:AlternateContent xmlns:mc="http://schemas.openxmlformats.org/markup-compatibility/2006">
-        <mc:Choice xmlns:a14="http://schemas.microsoft.com/office/drawing/2010/main" Requires="a14">
+      <mc:AlternateContent xmlns:mc="http://schemas.openxmlformats.org/markup-compatibility/2006" xmlns:a14="http://schemas.microsoft.com/office/drawing/2010/main">
+        <mc:Choice Requires="a14">
           <p:sp>
             <p:nvSpPr>
               <p:cNvPr id="3" name="CasellaDiTesto 2">
@@ -5206,7 +5647,7 @@
             </p:txBody>
           </p:sp>
         </mc:Choice>
-        <mc:Fallback>
+        <mc:Fallback xmlns="">
           <p:sp>
             <p:nvSpPr>
               <p:cNvPr id="3" name="CasellaDiTesto 2">
@@ -5428,7 +5869,15 @@
                 </a:r>
                 <a:r>
                   <a:rPr lang="en-GB" sz="2800" noProof="0" dirty="0"/>
-                  <a:t> arbitrary</a:t>
+                  <a:t> </a:t>
+                </a:r>
+                <a:r>
+                  <a:rPr lang="en-GB" sz="2800" b="1" noProof="0" dirty="0">
+                    <a:solidFill>
+                      <a:srgbClr val="FF0000"/>
+                    </a:solidFill>
+                  </a:rPr>
+                  <a:t>arbitrary</a:t>
                 </a:r>
               </a:p>
               <a:p>
@@ -5661,10 +6110,110 @@
               <a:p>
                 <a:r>
                   <a:rPr lang="en-US" sz="2800" dirty="0"/>
-                  <a:t>We assumed we were moving in a bounded region </a:t>
+                  <a:t>Under the assumption that we had </a:t>
+                </a:r>
+                <a:r>
+                  <a:rPr lang="en-US" sz="2800" b="1" dirty="0">
+                    <a:solidFill>
+                      <a:srgbClr val="FF0000"/>
+                    </a:solidFill>
+                  </a:rPr>
+                  <a:t>bounded gradients</a:t>
                 </a:r>
               </a:p>
               <a:p>
+                <a14:m>
+                  <m:oMathPara xmlns:m="http://schemas.openxmlformats.org/officeDocument/2006/math">
+                    <m:oMathParaPr>
+                      <m:jc m:val="centerGroup"/>
+                    </m:oMathParaPr>
+                    <m:oMath xmlns:m="http://schemas.openxmlformats.org/officeDocument/2006/math">
+                      <m:d>
+                        <m:dPr>
+                          <m:begChr m:val="‖"/>
+                          <m:endChr m:val="‖"/>
+                          <m:ctrlPr>
+                            <a:rPr lang="en-US" sz="2800" i="1" smtClean="0">
+                              <a:latin typeface="Cambria Math" panose="02040503050406030204" pitchFamily="18" charset="0"/>
+                            </a:rPr>
+                          </m:ctrlPr>
+                        </m:dPr>
+                        <m:e>
+                          <m:r>
+                            <m:rPr>
+                              <m:sty m:val="p"/>
+                            </m:rPr>
+                            <a:rPr lang="en-US" sz="2800" i="1" smtClean="0">
+                              <a:latin typeface="Cambria Math" panose="02040503050406030204" pitchFamily="18" charset="0"/>
+                              <a:ea typeface="Cambria Math" panose="02040503050406030204" pitchFamily="18" charset="0"/>
+                            </a:rPr>
+                            <m:t>∇</m:t>
+                          </m:r>
+                          <m:r>
+                            <a:rPr lang="it-IT" sz="2800" b="0" i="1" smtClean="0">
+                              <a:latin typeface="Cambria Math" panose="02040503050406030204" pitchFamily="18" charset="0"/>
+                              <a:ea typeface="Cambria Math" panose="02040503050406030204" pitchFamily="18" charset="0"/>
+                            </a:rPr>
+                            <m:t>𝑓</m:t>
+                          </m:r>
+                          <m:r>
+                            <a:rPr lang="it-IT" sz="2800" b="0" i="1" smtClean="0">
+                              <a:latin typeface="Cambria Math" panose="02040503050406030204" pitchFamily="18" charset="0"/>
+                              <a:ea typeface="Cambria Math" panose="02040503050406030204" pitchFamily="18" charset="0"/>
+                            </a:rPr>
+                            <m:t>(</m:t>
+                          </m:r>
+                          <m:r>
+                            <a:rPr lang="it-IT" sz="2800" b="0" i="1" smtClean="0">
+                              <a:latin typeface="Cambria Math" panose="02040503050406030204" pitchFamily="18" charset="0"/>
+                              <a:ea typeface="Cambria Math" panose="02040503050406030204" pitchFamily="18" charset="0"/>
+                            </a:rPr>
+                            <m:t>𝑥</m:t>
+                          </m:r>
+                          <m:r>
+                            <a:rPr lang="it-IT" sz="2800" b="0" i="1" smtClean="0">
+                              <a:latin typeface="Cambria Math" panose="02040503050406030204" pitchFamily="18" charset="0"/>
+                              <a:ea typeface="Cambria Math" panose="02040503050406030204" pitchFamily="18" charset="0"/>
+                            </a:rPr>
+                            <m:t>)</m:t>
+                          </m:r>
+                        </m:e>
+                      </m:d>
+                      <m:r>
+                        <a:rPr lang="en-US" sz="2800" i="1" smtClean="0">
+                          <a:latin typeface="Cambria Math" panose="02040503050406030204" pitchFamily="18" charset="0"/>
+                          <a:ea typeface="Cambria Math" panose="02040503050406030204" pitchFamily="18" charset="0"/>
+                        </a:rPr>
+                        <m:t>≤</m:t>
+                      </m:r>
+                      <m:r>
+                        <a:rPr lang="it-IT" sz="2800" b="0" i="1" smtClean="0">
+                          <a:latin typeface="Cambria Math" panose="02040503050406030204" pitchFamily="18" charset="0"/>
+                          <a:ea typeface="Cambria Math" panose="02040503050406030204" pitchFamily="18" charset="0"/>
+                        </a:rPr>
+                        <m:t>𝐵</m:t>
+                      </m:r>
+                    </m:oMath>
+                  </m:oMathPara>
+                </a14:m>
+                <a:endParaRPr lang="it-IT" sz="2800" dirty="0">
+                  <a:ea typeface="Cambria Math" panose="02040503050406030204" pitchFamily="18" charset="0"/>
+                </a:endParaRPr>
+              </a:p>
+              <a:p>
+                <a:endParaRPr lang="en-US" sz="2800" dirty="0"/>
+              </a:p>
+              <a:p>
+                <a:r>
+                  <a:rPr lang="en-US" sz="2800" dirty="0"/>
+                  <a:t>we considered:</a:t>
+                </a:r>
+              </a:p>
+              <a:p>
+                <a:pPr marL="457200" indent="-457200">
+                  <a:buFont typeface="Arial" panose="020B0604020202020204" pitchFamily="34" charset="0"/>
+                  <a:buChar char="•"/>
+                </a:pPr>
                 <a:r>
                   <a:rPr lang="en-US" sz="2800" dirty="0"/>
                   <a:t>|| x</a:t>
@@ -5675,26 +6224,7 @@
                 </a:r>
                 <a:r>
                   <a:rPr lang="en-US" sz="2800" dirty="0"/>
-                  <a:t> – x*||&lt;R for simplicity. </a:t>
-                </a:r>
-              </a:p>
-              <a:p>
-                <a:endParaRPr lang="en-US" sz="2800" dirty="0"/>
-              </a:p>
-              <a:p>
-                <a:r>
-                  <a:rPr lang="en-US" sz="2800" dirty="0"/>
-                  <a:t>We considered:</a:t>
-                </a:r>
-              </a:p>
-              <a:p>
-                <a:pPr marL="457200" indent="-457200">
-                  <a:buFont typeface="Arial" panose="020B0604020202020204" pitchFamily="34" charset="0"/>
-                  <a:buChar char="•"/>
-                </a:pPr>
-                <a:r>
-                  <a:rPr lang="en-US" sz="2800" dirty="0"/>
-                  <a:t>R = 25</a:t>
+                  <a:t> – x*||&lt;R  = 25</a:t>
                 </a:r>
               </a:p>
               <a:p>
@@ -5982,7 +6512,24 @@
                 <a:latin typeface="Arial" panose="020B0604020202020204" pitchFamily="34" charset="0"/>
                 <a:cs typeface="Arial" panose="020B0604020202020204" pitchFamily="34" charset="0"/>
               </a:rPr>
-              <a:t>The step size used for bounded stochastic gradient causes the algorithm to get closer to the optimum, but on average it’s still very similar to the previous method.  </a:t>
+              <a:t>The step size used for bounded stochastic gradient causes the algorithm to get closer to the optimum, but on average it’s still </a:t>
+            </a:r>
+            <a:r>
+              <a:rPr lang="en-GB" sz="2800" b="1" noProof="0" dirty="0">
+                <a:solidFill>
+                  <a:srgbClr val="FF0000"/>
+                </a:solidFill>
+                <a:latin typeface="Arial" panose="020B0604020202020204" pitchFamily="34" charset="0"/>
+                <a:cs typeface="Arial" panose="020B0604020202020204" pitchFamily="34" charset="0"/>
+              </a:rPr>
+              <a:t>very similar </a:t>
+            </a:r>
+            <a:r>
+              <a:rPr lang="en-GB" sz="2800" noProof="0" dirty="0">
+                <a:latin typeface="Arial" panose="020B0604020202020204" pitchFamily="34" charset="0"/>
+                <a:cs typeface="Arial" panose="020B0604020202020204" pitchFamily="34" charset="0"/>
+              </a:rPr>
+              <a:t>to the previous method.  </a:t>
             </a:r>
           </a:p>
         </p:txBody>
@@ -6107,8 +6654,8 @@
             </p:nvSpPr>
             <p:spPr>
               <a:xfrm>
-                <a:off x="762000" y="1143000"/>
-                <a:ext cx="5334000" cy="5676747"/>
+                <a:off x="761999" y="1143000"/>
+                <a:ext cx="5638801" cy="4814972"/>
               </a:xfrm>
               <a:prstGeom prst="rect">
                 <a:avLst/>
@@ -6123,7 +6670,19 @@
               <a:p>
                 <a:r>
                   <a:rPr lang="en-US" sz="2800" dirty="0"/>
-                  <a:t>We recalled the fact that the chosen objective function is strongly convex w. parameter </a:t>
+                  <a:t>We recalled the fact that the chosen objective function is </a:t>
+                </a:r>
+                <a:r>
+                  <a:rPr lang="en-US" sz="2800" b="1" dirty="0">
+                    <a:solidFill>
+                      <a:srgbClr val="FF0000"/>
+                    </a:solidFill>
+                  </a:rPr>
+                  <a:t>strongly convex </a:t>
+                </a:r>
+                <a:r>
+                  <a:rPr lang="en-US" sz="2800" dirty="0"/>
+                  <a:t>w. parameter </a:t>
                 </a:r>
                 <a14:m>
                   <m:oMath xmlns:m="http://schemas.openxmlformats.org/officeDocument/2006/math">
@@ -6134,12 +6693,21 @@
                       </a:rPr>
                       <m:t>𝜇</m:t>
                     </m:r>
+                    <m:r>
+                      <a:rPr lang="it-IT" sz="2800" b="0" i="0" smtClean="0">
+                        <a:latin typeface="Cambria Math" panose="02040503050406030204" pitchFamily="18" charset="0"/>
+                        <a:ea typeface="Cambria Math" panose="02040503050406030204" pitchFamily="18" charset="0"/>
+                      </a:rPr>
+                      <m:t>.</m:t>
+                    </m:r>
                   </m:oMath>
                 </a14:m>
-                <a:r>
-                  <a:rPr lang="en-US" sz="2800" dirty="0"/>
-                  <a:t>;</a:t>
-                </a:r>
+                <a:endParaRPr lang="it-IT" sz="2800" b="0" dirty="0">
+                  <a:ea typeface="Cambria Math" panose="02040503050406030204" pitchFamily="18" charset="0"/>
+                </a:endParaRPr>
+              </a:p>
+              <a:p>
+                <a:endParaRPr lang="en-US" sz="2800" dirty="0"/>
               </a:p>
               <a:p>
                 <a:r>
@@ -6148,7 +6716,6 @@
                 </a:r>
               </a:p>
               <a:p>
-                <a:pPr/>
                 <a14:m>
                   <m:oMath xmlns:m="http://schemas.openxmlformats.org/officeDocument/2006/math">
                     <m:r>
@@ -6218,14 +6785,19 @@
                 </a14:m>
                 <a:r>
                   <a:rPr lang="en-US" sz="2800" dirty="0"/>
-                  <a:t> , but the resulting step size would have been too small to ever reach the optimum.</a:t>
+                  <a:t>  </a:t>
                 </a:r>
               </a:p>
               <a:p>
-                <a:pPr/>
                 <a:r>
                   <a:rPr lang="en-US" sz="2800" dirty="0"/>
-                  <a:t>For that reason, we chose to apply </a:t>
+                  <a:t>but the resulting step size would have been too small.</a:t>
+                </a:r>
+              </a:p>
+              <a:p>
+                <a:r>
+                  <a:rPr lang="en-US" sz="2800" dirty="0"/>
+                  <a:t>We chose to apply </a:t>
                 </a:r>
                 <a14:m>
                   <m:oMath xmlns:m="http://schemas.openxmlformats.org/officeDocument/2006/math">
@@ -6273,16 +6845,6 @@
                     </m:f>
                   </m:oMath>
                 </a14:m>
-                <a:r>
-                  <a:rPr lang="en-US" sz="2800" dirty="0"/>
-                  <a:t> , obtaining:</a:t>
-                </a:r>
-              </a:p>
-              <a:p>
-                <a:pPr marL="457200" indent="-457200">
-                  <a:buFont typeface="Arial" panose="020B0604020202020204" pitchFamily="34" charset="0"/>
-                  <a:buChar char="•"/>
-                </a:pPr>
                 <a:endParaRPr lang="en-US" sz="2800" dirty="0"/>
               </a:p>
               <a:p>
@@ -6308,8 +6870,8 @@
             </p:nvSpPr>
             <p:spPr>
               <a:xfrm>
-                <a:off x="762000" y="1143000"/>
-                <a:ext cx="5334000" cy="5676747"/>
+                <a:off x="761999" y="1143000"/>
+                <a:ext cx="5638801" cy="4814972"/>
               </a:xfrm>
               <a:prstGeom prst="rect">
                 <a:avLst/>
@@ -6317,7 +6879,7 @@
               <a:blipFill>
                 <a:blip r:embed="rId2"/>
                 <a:stretch>
-                  <a:fillRect l="-2286" t="-1182" r="-1943"/>
+                  <a:fillRect l="-2162" t="-1394"/>
                 </a:stretch>
               </a:blipFill>
             </p:spPr>
@@ -6364,8 +6926,8 @@
         </p:blipFill>
         <p:spPr>
           <a:xfrm>
-            <a:off x="6248399" y="1371600"/>
-            <a:ext cx="5467083" cy="4114800"/>
+            <a:off x="6349642" y="1295400"/>
+            <a:ext cx="5264599" cy="3962400"/>
           </a:xfrm>
           <a:prstGeom prst="rect">
             <a:avLst/>
@@ -6475,7 +7037,19 @@
               <a:p>
                 <a:r>
                   <a:rPr lang="en-US" sz="2800" dirty="0"/>
-                  <a:t>The distance from the optimal objective is much smaller using step size </a:t>
+                  <a:t>The distance from the optimal objective is </a:t>
+                </a:r>
+                <a:r>
+                  <a:rPr lang="en-US" sz="2800" b="1" dirty="0">
+                    <a:solidFill>
+                      <a:srgbClr val="FF0000"/>
+                    </a:solidFill>
+                  </a:rPr>
+                  <a:t>much smaller </a:t>
+                </a:r>
+                <a:r>
+                  <a:rPr lang="en-US" sz="2800" dirty="0"/>
+                  <a:t>using step size </a:t>
                 </a:r>
                 <a:endParaRPr lang="it-IT" sz="2800" i="1" dirty="0">
                   <a:latin typeface="Cambria Math" panose="02040503050406030204" pitchFamily="18" charset="0"/>
@@ -6725,6 +7299,9 @@
                 </a:r>
                 <a:r>
                   <a:rPr lang="en-US" sz="2800" b="1" dirty="0">
+                    <a:solidFill>
+                      <a:srgbClr val="FF0000"/>
+                    </a:solidFill>
                     <a:latin typeface="Arial" panose="020B0604020202020204" pitchFamily="34" charset="0"/>
                     <a:cs typeface="Arial" panose="020B0604020202020204" pitchFamily="34" charset="0"/>
                   </a:rPr>
@@ -6739,6 +7316,9 @@
                 </a:r>
                 <a:r>
                   <a:rPr lang="en-US" sz="2800" b="1" dirty="0">
+                    <a:solidFill>
+                      <a:srgbClr val="FF0000"/>
+                    </a:solidFill>
                     <a:latin typeface="Arial" panose="020B0604020202020204" pitchFamily="34" charset="0"/>
                     <a:cs typeface="Arial" panose="020B0604020202020204" pitchFamily="34" charset="0"/>
                   </a:rPr>
@@ -6753,6 +7333,9 @@
                 </a:r>
                 <a:r>
                   <a:rPr lang="en-US" sz="2800" b="1" dirty="0">
+                    <a:solidFill>
+                      <a:srgbClr val="FF0000"/>
+                    </a:solidFill>
                     <a:latin typeface="Arial" panose="020B0604020202020204" pitchFamily="34" charset="0"/>
                     <a:cs typeface="Arial" panose="020B0604020202020204" pitchFamily="34" charset="0"/>
                   </a:rPr>
@@ -6831,7 +7414,41 @@
                     <a:latin typeface="Arial" panose="020B0604020202020204" pitchFamily="34" charset="0"/>
                     <a:cs typeface="Arial" panose="020B0604020202020204" pitchFamily="34" charset="0"/>
                   </a:rPr>
-                  <a:t> , this time extending the max number of iterations to 100 and utilizing a minibatch size of 32 (the same values we were going to use for the other methods)</a:t>
+                  <a:t> , this time extending the max number of iterations to 100 and utilizing a </a:t>
+                </a:r>
+                <a:r>
+                  <a:rPr lang="en-US" sz="2800" b="1" dirty="0">
+                    <a:solidFill>
+                      <a:srgbClr val="FF0000"/>
+                    </a:solidFill>
+                    <a:latin typeface="Arial" panose="020B0604020202020204" pitchFamily="34" charset="0"/>
+                    <a:cs typeface="Arial" panose="020B0604020202020204" pitchFamily="34" charset="0"/>
+                  </a:rPr>
+                  <a:t>minibatch size</a:t>
+                </a:r>
+                <a:r>
+                  <a:rPr lang="en-US" sz="2800" dirty="0">
+                    <a:latin typeface="Arial" panose="020B0604020202020204" pitchFamily="34" charset="0"/>
+                    <a:cs typeface="Arial" panose="020B0604020202020204" pitchFamily="34" charset="0"/>
+                  </a:rPr>
+                  <a:t> of </a:t>
+                </a:r>
+                <a:r>
+                  <a:rPr lang="en-US" sz="2800" b="1" dirty="0">
+                    <a:solidFill>
+                      <a:srgbClr val="FF0000"/>
+                    </a:solidFill>
+                    <a:latin typeface="Arial" panose="020B0604020202020204" pitchFamily="34" charset="0"/>
+                    <a:cs typeface="Arial" panose="020B0604020202020204" pitchFamily="34" charset="0"/>
+                  </a:rPr>
+                  <a:t>32</a:t>
+                </a:r>
+                <a:r>
+                  <a:rPr lang="en-US" sz="2800" dirty="0">
+                    <a:latin typeface="Arial" panose="020B0604020202020204" pitchFamily="34" charset="0"/>
+                    <a:cs typeface="Arial" panose="020B0604020202020204" pitchFamily="34" charset="0"/>
+                  </a:rPr>
+                  <a:t> (the same values we were going to use for the other methods)</a:t>
                 </a:r>
               </a:p>
               <a:p>
@@ -6994,7 +7611,19 @@
               <a:p>
                 <a:r>
                   <a:rPr lang="en-US" sz="2800" dirty="0"/>
-                  <a:t>ADAGRAD adapts the learning rate for each parameter based on the accumulated squared gradients. Parameters with larger gradients in the past get smaller learning rates over time, while parameters with smaller gradients keep relatively higher learning rates.</a:t>
+                  <a:t>ADAGRAD adapts the learning rate for each parameter based on the </a:t>
+                </a:r>
+                <a:r>
+                  <a:rPr lang="en-US" sz="2800" b="1" dirty="0">
+                    <a:solidFill>
+                      <a:srgbClr val="FF0000"/>
+                    </a:solidFill>
+                  </a:rPr>
+                  <a:t>accumulated squared gradients</a:t>
+                </a:r>
+                <a:r>
+                  <a:rPr lang="en-US" sz="2800" dirty="0"/>
+                  <a:t>. Parameters with larger gradients in the past get smaller learning rates over time, while parameters with smaller gradients keep relatively higher learning rates.</a:t>
                 </a:r>
               </a:p>
               <a:p>
@@ -7016,14 +7645,7 @@
                         <a:latin typeface="Cambria Math" panose="02040503050406030204" pitchFamily="18" charset="0"/>
                         <a:ea typeface="Cambria Math" panose="02040503050406030204" pitchFamily="18" charset="0"/>
                       </a:rPr>
-                      <m:t>=</m:t>
-                    </m:r>
-                    <m:r>
-                      <a:rPr lang="it-IT" sz="2800" b="0" i="1" smtClean="0">
-                        <a:latin typeface="Cambria Math" panose="02040503050406030204" pitchFamily="18" charset="0"/>
-                        <a:ea typeface="Cambria Math" panose="02040503050406030204" pitchFamily="18" charset="0"/>
-                      </a:rPr>
-                      <m:t>0.001</m:t>
+                      <m:t>=0.001</m:t>
                     </m:r>
                   </m:oMath>
                 </a14:m>
@@ -7641,7 +8263,19 @@
           <a:p>
             <a:r>
               <a:rPr lang="en-US" sz="2800" dirty="0"/>
-              <a:t>Adam is an adaptive optimization algorithm that maintains exponentially decaying averages of past gradients (first moment) and squared gradients (second moment), which are used to adapt the learning rate for each parameter individually.</a:t>
+              <a:t>Adam is an </a:t>
+            </a:r>
+            <a:r>
+              <a:rPr lang="en-US" sz="2800" b="1" dirty="0">
+                <a:solidFill>
+                  <a:srgbClr val="FF0000"/>
+                </a:solidFill>
+              </a:rPr>
+              <a:t>adaptive optimization </a:t>
+            </a:r>
+            <a:r>
+              <a:rPr lang="en-US" sz="2800" dirty="0"/>
+              <a:t>algorithm that maintains exponentially decaying averages of past gradients (first moment) and squared gradients (second moment), which are used to adapt the learning rate for each parameter individually.</a:t>
             </a:r>
             <a:br>
               <a:rPr lang="en-US" sz="2800" dirty="0"/>
@@ -7898,7 +8532,19 @@
           <a:p>
             <a:r>
               <a:rPr lang="en-US" sz="2800" dirty="0"/>
-              <a:t>Sign SGD operates in a much more similar way to basic SGD but uses the sign of the gradient for each parameter as step direction instead of its value.</a:t>
+              <a:t>Sign SGD operates in a much more similar way to basic SGD but uses the </a:t>
+            </a:r>
+            <a:r>
+              <a:rPr lang="en-US" sz="2800" b="1" dirty="0">
+                <a:solidFill>
+                  <a:srgbClr val="FF0000"/>
+                </a:solidFill>
+              </a:rPr>
+              <a:t>sign of the gradient </a:t>
+            </a:r>
+            <a:r>
+              <a:rPr lang="en-US" sz="2800" dirty="0"/>
+              <a:t>for each parameter as step direction instead of its value.</a:t>
             </a:r>
           </a:p>
           <a:p>
@@ -8065,8 +8711,16 @@
               <a:buChar char="•"/>
             </a:pPr>
             <a:r>
+              <a:rPr lang="en-US" sz="1600" b="1" dirty="0">
+                <a:solidFill>
+                  <a:srgbClr val="00B050"/>
+                </a:solidFill>
+              </a:rPr>
+              <a:t>ADAM</a:t>
+            </a:r>
+            <a:r>
               <a:rPr lang="en-US" sz="1600" dirty="0"/>
-              <a:t>ADAM is the fastest method out of the four, as it adapts the learning rate of each parameter using momentum, resulting in "smarter" adjustments;</a:t>
+              <a:t> is the fastest method out of the four, as it adapts the learning rate of each parameter using momentum, resulting in "smarter" adjustments;</a:t>
             </a:r>
           </a:p>
           <a:p>
@@ -8078,8 +8732,12 @@
               <a:buChar char="•"/>
             </a:pPr>
             <a:r>
+              <a:rPr lang="en-US" sz="1600" b="1" dirty="0"/>
+              <a:t>Sign SGD </a:t>
+            </a:r>
+            <a:r>
               <a:rPr lang="en-US" sz="1600" dirty="0"/>
-              <a:t>Sign SGD is the second fastest, as it applies simple constant updates always in the same direction;</a:t>
+              <a:t>is the second fastest, as it applies simple constant updates always in the same direction;</a:t>
             </a:r>
           </a:p>
           <a:p>
@@ -8095,8 +8753,16 @@
               <a:buChar char="•"/>
             </a:pPr>
             <a:r>
+              <a:rPr lang="en-US" sz="1600" b="1" dirty="0">
+                <a:solidFill>
+                  <a:srgbClr val="FF0000"/>
+                </a:solidFill>
+              </a:rPr>
+              <a:t>Minibatch Gradient Descent </a:t>
+            </a:r>
+            <a:r>
               <a:rPr lang="en-US" sz="1600" dirty="0"/>
-              <a:t>Minibatch Gradient Descent is relatively slower, as calculating the gradient stochastically may result in less decisive steps, requiring more iterations;</a:t>
+              <a:t>is relatively slower, as calculating the gradient stochastically may result in less decisive steps, requiring more iterations;</a:t>
             </a:r>
           </a:p>
           <a:p>
@@ -8108,8 +8774,16 @@
               <a:buChar char="•"/>
             </a:pPr>
             <a:r>
+              <a:rPr lang="en-US" sz="1600" b="1" dirty="0">
+                <a:solidFill>
+                  <a:srgbClr val="0070C0"/>
+                </a:solidFill>
+              </a:rPr>
+              <a:t>ADAGRAD</a:t>
+            </a:r>
+            <a:r>
               <a:rPr lang="en-US" sz="1600" dirty="0"/>
-              <a:t>ADAGRAD is the slowest, as the step size is inversely proportional to the gradient values, resulting in small updates that get smaller and smaller.</a:t>
+              <a:t> is the slowest, as the step size is inversely proportional to the gradient values, resulting in small updates that get smaller and smaller.</a:t>
             </a:r>
           </a:p>
         </p:txBody>
@@ -8148,6 +8822,1481 @@
     <p:extLst>
       <p:ext uri="{BB962C8B-B14F-4D97-AF65-F5344CB8AC3E}">
         <p14:creationId xmlns:p14="http://schemas.microsoft.com/office/powerpoint/2010/main" val="3912129253"/>
+      </p:ext>
+    </p:extLst>
+  </p:cSld>
+  <p:clrMapOvr>
+    <a:masterClrMapping/>
+  </p:clrMapOvr>
+</p:sld>
+</file>
+
+<file path=ppt/slides/slide33.xml><?xml version="1.0" encoding="utf-8"?>
+<p:sld xmlns:a="http://schemas.openxmlformats.org/drawingml/2006/main" xmlns:r="http://schemas.openxmlformats.org/officeDocument/2006/relationships" xmlns:p="http://schemas.openxmlformats.org/presentationml/2006/main">
+  <p:cSld>
+    <p:spTree>
+      <p:nvGrpSpPr>
+        <p:cNvPr id="1" name="">
+          <a:extLst>
+            <a:ext uri="{FF2B5EF4-FFF2-40B4-BE49-F238E27FC236}">
+              <a16:creationId xmlns:a16="http://schemas.microsoft.com/office/drawing/2014/main" id="{80523AA1-7560-6545-17CF-D48BAF413D5D}"/>
+            </a:ext>
+          </a:extLst>
+        </p:cNvPr>
+        <p:cNvGrpSpPr/>
+        <p:nvPr/>
+      </p:nvGrpSpPr>
+      <p:grpSpPr>
+        <a:xfrm>
+          <a:off x="0" y="0"/>
+          <a:ext cx="0" cy="0"/>
+          <a:chOff x="0" y="0"/>
+          <a:chExt cx="0" cy="0"/>
+        </a:xfrm>
+      </p:grpSpPr>
+      <p:sp>
+        <p:nvSpPr>
+          <p:cNvPr id="10" name="Titolo 9">
+            <a:extLst>
+              <a:ext uri="{FF2B5EF4-FFF2-40B4-BE49-F238E27FC236}">
+                <a16:creationId xmlns:a16="http://schemas.microsoft.com/office/drawing/2014/main" id="{149251A8-42BB-FD35-2075-CF7F7037DA96}"/>
+              </a:ext>
+            </a:extLst>
+          </p:cNvPr>
+          <p:cNvSpPr>
+            <a:spLocks noGrp="1"/>
+          </p:cNvSpPr>
+          <p:nvPr>
+            <p:ph type="title"/>
+          </p:nvPr>
+        </p:nvSpPr>
+        <p:spPr>
+          <a:xfrm>
+            <a:off x="762000" y="457200"/>
+            <a:ext cx="6400800" cy="538609"/>
+          </a:xfrm>
+        </p:spPr>
+        <p:txBody>
+          <a:bodyPr/>
+          <a:lstStyle/>
+          <a:p>
+            <a:r>
+              <a:rPr lang="en-GB" noProof="0" dirty="0">
+                <a:latin typeface="Arial Black" panose="020B0A04020102020204" pitchFamily="34" charset="0"/>
+              </a:rPr>
+              <a:t>Coordinate descent</a:t>
+            </a:r>
+          </a:p>
+        </p:txBody>
+      </p:sp>
+      <mc:AlternateContent xmlns:mc="http://schemas.openxmlformats.org/markup-compatibility/2006">
+        <mc:Choice xmlns:a14="http://schemas.microsoft.com/office/drawing/2010/main" Requires="a14">
+          <p:sp>
+            <p:nvSpPr>
+              <p:cNvPr id="4" name="CasellaDiTesto 3">
+                <a:extLst>
+                  <a:ext uri="{FF2B5EF4-FFF2-40B4-BE49-F238E27FC236}">
+                    <a16:creationId xmlns:a16="http://schemas.microsoft.com/office/drawing/2014/main" id="{860283F7-FBB7-B47A-F2E5-16EF1CF1B194}"/>
+                  </a:ext>
+                </a:extLst>
+              </p:cNvPr>
+              <p:cNvSpPr txBox="1"/>
+              <p:nvPr/>
+            </p:nvSpPr>
+            <p:spPr>
+              <a:xfrm>
+                <a:off x="762000" y="1600200"/>
+                <a:ext cx="10287000" cy="3286028"/>
+              </a:xfrm>
+              <a:prstGeom prst="rect">
+                <a:avLst/>
+              </a:prstGeom>
+              <a:noFill/>
+            </p:spPr>
+            <p:txBody>
+              <a:bodyPr wrap="square">
+                <a:spAutoFit/>
+              </a:bodyPr>
+              <a:lstStyle/>
+              <a:p>
+                <a:r>
+                  <a:rPr lang="en-US" sz="2800" dirty="0"/>
+                  <a:t>The next step of the analysis was to compare the different possible techniques used for coordinate gradient descent, that consists in </a:t>
+                </a:r>
+                <a:r>
+                  <a:rPr lang="en-US" sz="2800" b="1" dirty="0"/>
+                  <a:t>updating</a:t>
+                </a:r>
+                <a:r>
+                  <a:rPr lang="en-US" sz="2800" dirty="0"/>
+                  <a:t> only </a:t>
+                </a:r>
+                <a:r>
+                  <a:rPr lang="en-US" sz="2800" b="1" dirty="0"/>
+                  <a:t>one dimension </a:t>
+                </a:r>
+                <a:r>
+                  <a:rPr lang="en-US" sz="2800" dirty="0"/>
+                  <a:t>of the feature array x  for each step.</a:t>
+                </a:r>
+              </a:p>
+              <a:p>
+                <a:endParaRPr lang="en-US" sz="2800" dirty="0"/>
+              </a:p>
+              <a:p>
+                <a:r>
+                  <a:rPr lang="en-US" sz="2800" dirty="0"/>
+                  <a:t>For testing we will use step size </a:t>
+                </a:r>
+                <a14:m>
+                  <m:oMath xmlns:m="http://schemas.openxmlformats.org/officeDocument/2006/math">
+                    <m:r>
+                      <a:rPr lang="en-US" sz="2800" i="1" smtClean="0">
+                        <a:latin typeface="Cambria Math" panose="02040503050406030204" pitchFamily="18" charset="0"/>
+                        <a:ea typeface="Cambria Math" panose="02040503050406030204" pitchFamily="18" charset="0"/>
+                      </a:rPr>
+                      <m:t>𝛾</m:t>
+                    </m:r>
+                    <m:r>
+                      <a:rPr lang="it-IT" sz="2800" b="0" i="1" smtClean="0">
+                        <a:latin typeface="Cambria Math" panose="02040503050406030204" pitchFamily="18" charset="0"/>
+                        <a:ea typeface="Cambria Math" panose="02040503050406030204" pitchFamily="18" charset="0"/>
+                      </a:rPr>
+                      <m:t>= </m:t>
+                    </m:r>
+                    <m:f>
+                      <m:fPr>
+                        <m:ctrlPr>
+                          <a:rPr lang="it-IT" sz="2800" b="0" i="1" smtClean="0">
+                            <a:latin typeface="Cambria Math" panose="02040503050406030204" pitchFamily="18" charset="0"/>
+                            <a:ea typeface="Cambria Math" panose="02040503050406030204" pitchFamily="18" charset="0"/>
+                          </a:rPr>
+                        </m:ctrlPr>
+                      </m:fPr>
+                      <m:num>
+                        <m:r>
+                          <a:rPr lang="it-IT" sz="2800" b="0" i="1" smtClean="0">
+                            <a:latin typeface="Cambria Math" panose="02040503050406030204" pitchFamily="18" charset="0"/>
+                            <a:ea typeface="Cambria Math" panose="02040503050406030204" pitchFamily="18" charset="0"/>
+                          </a:rPr>
+                          <m:t>1</m:t>
+                        </m:r>
+                      </m:num>
+                      <m:den>
+                        <m:r>
+                          <a:rPr lang="it-IT" sz="2800" b="0" i="1" smtClean="0">
+                            <a:latin typeface="Cambria Math" panose="02040503050406030204" pitchFamily="18" charset="0"/>
+                            <a:ea typeface="Cambria Math" panose="02040503050406030204" pitchFamily="18" charset="0"/>
+                          </a:rPr>
+                          <m:t>𝐿</m:t>
+                        </m:r>
+                      </m:den>
+                    </m:f>
+                  </m:oMath>
+                </a14:m>
+                <a:r>
+                  <a:rPr lang="en-US" sz="2800" dirty="0"/>
+                  <a:t>,with L being the Lipschitz constant. </a:t>
+                </a:r>
+              </a:p>
+            </p:txBody>
+          </p:sp>
+        </mc:Choice>
+        <mc:Fallback>
+          <p:sp>
+            <p:nvSpPr>
+              <p:cNvPr id="4" name="CasellaDiTesto 3">
+                <a:extLst>
+                  <a:ext uri="{FF2B5EF4-FFF2-40B4-BE49-F238E27FC236}">
+                    <a16:creationId xmlns:a16="http://schemas.microsoft.com/office/drawing/2014/main" id="{860283F7-FBB7-B47A-F2E5-16EF1CF1B194}"/>
+                  </a:ext>
+                </a:extLst>
+              </p:cNvPr>
+              <p:cNvSpPr txBox="1">
+                <a:spLocks noRot="1" noChangeAspect="1" noMove="1" noResize="1" noEditPoints="1" noAdjustHandles="1" noChangeArrowheads="1" noChangeShapeType="1" noTextEdit="1"/>
+              </p:cNvSpPr>
+              <p:nvPr/>
+            </p:nvSpPr>
+            <p:spPr>
+              <a:xfrm>
+                <a:off x="762000" y="1600200"/>
+                <a:ext cx="10287000" cy="3286028"/>
+              </a:xfrm>
+              <a:prstGeom prst="rect">
+                <a:avLst/>
+              </a:prstGeom>
+              <a:blipFill>
+                <a:blip r:embed="rId2"/>
+                <a:stretch>
+                  <a:fillRect l="-1185" t="-2041" r="-2133" b="-4082"/>
+                </a:stretch>
+              </a:blipFill>
+            </p:spPr>
+            <p:txBody>
+              <a:bodyPr/>
+              <a:lstStyle/>
+              <a:p>
+                <a:r>
+                  <a:rPr lang="it-IT">
+                    <a:noFill/>
+                  </a:rPr>
+                  <a:t> </a:t>
+                </a:r>
+              </a:p>
+            </p:txBody>
+          </p:sp>
+        </mc:Fallback>
+      </mc:AlternateContent>
+    </p:spTree>
+    <p:extLst>
+      <p:ext uri="{BB962C8B-B14F-4D97-AF65-F5344CB8AC3E}">
+        <p14:creationId xmlns:p14="http://schemas.microsoft.com/office/powerpoint/2010/main" val="247652570"/>
+      </p:ext>
+    </p:extLst>
+  </p:cSld>
+  <p:clrMapOvr>
+    <a:masterClrMapping/>
+  </p:clrMapOvr>
+</p:sld>
+</file>
+
+<file path=ppt/slides/slide34.xml><?xml version="1.0" encoding="utf-8"?>
+<p:sld xmlns:a="http://schemas.openxmlformats.org/drawingml/2006/main" xmlns:r="http://schemas.openxmlformats.org/officeDocument/2006/relationships" xmlns:p="http://schemas.openxmlformats.org/presentationml/2006/main">
+  <p:cSld>
+    <p:spTree>
+      <p:nvGrpSpPr>
+        <p:cNvPr id="1" name="">
+          <a:extLst>
+            <a:ext uri="{FF2B5EF4-FFF2-40B4-BE49-F238E27FC236}">
+              <a16:creationId xmlns:a16="http://schemas.microsoft.com/office/drawing/2014/main" id="{209FC820-5EBA-437B-CD8B-EEF818714D9A}"/>
+            </a:ext>
+          </a:extLst>
+        </p:cNvPr>
+        <p:cNvGrpSpPr/>
+        <p:nvPr/>
+      </p:nvGrpSpPr>
+      <p:grpSpPr>
+        <a:xfrm>
+          <a:off x="0" y="0"/>
+          <a:ext cx="0" cy="0"/>
+          <a:chOff x="0" y="0"/>
+          <a:chExt cx="0" cy="0"/>
+        </a:xfrm>
+      </p:grpSpPr>
+      <p:sp>
+        <p:nvSpPr>
+          <p:cNvPr id="10" name="Titolo 9">
+            <a:extLst>
+              <a:ext uri="{FF2B5EF4-FFF2-40B4-BE49-F238E27FC236}">
+                <a16:creationId xmlns:a16="http://schemas.microsoft.com/office/drawing/2014/main" id="{53262397-875B-CC9D-ECAF-E7E9066A497F}"/>
+              </a:ext>
+            </a:extLst>
+          </p:cNvPr>
+          <p:cNvSpPr>
+            <a:spLocks noGrp="1"/>
+          </p:cNvSpPr>
+          <p:nvPr>
+            <p:ph type="title"/>
+          </p:nvPr>
+        </p:nvSpPr>
+        <p:spPr>
+          <a:xfrm>
+            <a:off x="762000" y="457200"/>
+            <a:ext cx="10287000" cy="538609"/>
+          </a:xfrm>
+        </p:spPr>
+        <p:txBody>
+          <a:bodyPr/>
+          <a:lstStyle/>
+          <a:p>
+            <a:r>
+              <a:rPr lang="en-GB" dirty="0">
+                <a:latin typeface="Arial Black" panose="020B0A04020102020204" pitchFamily="34" charset="0"/>
+              </a:rPr>
+              <a:t>Random c</a:t>
+            </a:r>
+            <a:r>
+              <a:rPr lang="en-GB" noProof="0" dirty="0" err="1">
+                <a:latin typeface="Arial Black" panose="020B0A04020102020204" pitchFamily="34" charset="0"/>
+              </a:rPr>
+              <a:t>oordinate</a:t>
+            </a:r>
+            <a:r>
+              <a:rPr lang="en-GB" noProof="0" dirty="0">
+                <a:latin typeface="Arial Black" panose="020B0A04020102020204" pitchFamily="34" charset="0"/>
+              </a:rPr>
+              <a:t> descent</a:t>
+            </a:r>
+          </a:p>
+        </p:txBody>
+      </p:sp>
+      <mc:AlternateContent xmlns:mc="http://schemas.openxmlformats.org/markup-compatibility/2006">
+        <mc:Choice xmlns:a14="http://schemas.microsoft.com/office/drawing/2010/main" Requires="a14">
+          <p:sp>
+            <p:nvSpPr>
+              <p:cNvPr id="4" name="CasellaDiTesto 3">
+                <a:extLst>
+                  <a:ext uri="{FF2B5EF4-FFF2-40B4-BE49-F238E27FC236}">
+                    <a16:creationId xmlns:a16="http://schemas.microsoft.com/office/drawing/2014/main" id="{CE25D19C-60CE-48EA-0BE0-0FDDEA00095D}"/>
+                  </a:ext>
+                </a:extLst>
+              </p:cNvPr>
+              <p:cNvSpPr txBox="1"/>
+              <p:nvPr/>
+            </p:nvSpPr>
+            <p:spPr>
+              <a:xfrm>
+                <a:off x="762000" y="1524000"/>
+                <a:ext cx="10287000" cy="2677656"/>
+              </a:xfrm>
+              <a:prstGeom prst="rect">
+                <a:avLst/>
+              </a:prstGeom>
+              <a:noFill/>
+            </p:spPr>
+            <p:txBody>
+              <a:bodyPr wrap="square">
+                <a:spAutoFit/>
+              </a:bodyPr>
+              <a:lstStyle/>
+              <a:p>
+                <a:r>
+                  <a:rPr lang="en-US" sz="2800" dirty="0"/>
+                  <a:t>In this variation of coordinate descent, the direction picked at any given step, </a:t>
+                </a:r>
+                <a14:m>
+                  <m:oMath xmlns:m="http://schemas.openxmlformats.org/officeDocument/2006/math">
+                    <m:r>
+                      <a:rPr lang="it-IT" sz="2800" b="0" i="1" smtClean="0">
+                        <a:latin typeface="Cambria Math" panose="02040503050406030204" pitchFamily="18" charset="0"/>
+                      </a:rPr>
+                      <m:t>𝑖</m:t>
+                    </m:r>
+                  </m:oMath>
+                </a14:m>
+                <a:r>
+                  <a:rPr lang="en-US" sz="2800" dirty="0"/>
+                  <a:t>, is </a:t>
+                </a:r>
+                <a:r>
+                  <a:rPr lang="en-US" sz="2800" b="1" dirty="0">
+                    <a:solidFill>
+                      <a:srgbClr val="FF0000"/>
+                    </a:solidFill>
+                  </a:rPr>
+                  <a:t>completely random</a:t>
+                </a:r>
+                <a:r>
+                  <a:rPr lang="en-US" sz="2800" dirty="0"/>
+                  <a:t>.</a:t>
+                </a:r>
+              </a:p>
+              <a:p>
+                <a:endParaRPr lang="en-US" sz="2800" dirty="0"/>
+              </a:p>
+              <a:p>
+                <a:r>
+                  <a:rPr lang="en-US" sz="2800" dirty="0"/>
+                  <a:t>This results in the algorithm reaching the optimum, but with a different number of steps at each execution</a:t>
+                </a:r>
+              </a:p>
+              <a:p>
+                <a:endParaRPr lang="en-US" sz="2800" dirty="0"/>
+              </a:p>
+            </p:txBody>
+          </p:sp>
+        </mc:Choice>
+        <mc:Fallback>
+          <p:sp>
+            <p:nvSpPr>
+              <p:cNvPr id="4" name="CasellaDiTesto 3">
+                <a:extLst>
+                  <a:ext uri="{FF2B5EF4-FFF2-40B4-BE49-F238E27FC236}">
+                    <a16:creationId xmlns:a16="http://schemas.microsoft.com/office/drawing/2014/main" id="{CE25D19C-60CE-48EA-0BE0-0FDDEA00095D}"/>
+                  </a:ext>
+                </a:extLst>
+              </p:cNvPr>
+              <p:cNvSpPr txBox="1">
+                <a:spLocks noRot="1" noChangeAspect="1" noMove="1" noResize="1" noEditPoints="1" noAdjustHandles="1" noChangeArrowheads="1" noChangeShapeType="1" noTextEdit="1"/>
+              </p:cNvSpPr>
+              <p:nvPr/>
+            </p:nvSpPr>
+            <p:spPr>
+              <a:xfrm>
+                <a:off x="762000" y="1524000"/>
+                <a:ext cx="10287000" cy="2677656"/>
+              </a:xfrm>
+              <a:prstGeom prst="rect">
+                <a:avLst/>
+              </a:prstGeom>
+              <a:blipFill>
+                <a:blip r:embed="rId2"/>
+                <a:stretch>
+                  <a:fillRect l="-1185" t="-2278"/>
+                </a:stretch>
+              </a:blipFill>
+            </p:spPr>
+            <p:txBody>
+              <a:bodyPr/>
+              <a:lstStyle/>
+              <a:p>
+                <a:r>
+                  <a:rPr lang="it-IT">
+                    <a:noFill/>
+                  </a:rPr>
+                  <a:t> </a:t>
+                </a:r>
+              </a:p>
+            </p:txBody>
+          </p:sp>
+        </mc:Fallback>
+      </mc:AlternateContent>
+      <p:pic>
+        <p:nvPicPr>
+          <p:cNvPr id="6" name="Immagine 5" descr="Immagine che contiene testo, schermata, bianco e nero, design&#10;&#10;Il contenuto generato dall'IA potrebbe non essere corretto.">
+            <a:extLst>
+              <a:ext uri="{FF2B5EF4-FFF2-40B4-BE49-F238E27FC236}">
+                <a16:creationId xmlns:a16="http://schemas.microsoft.com/office/drawing/2014/main" id="{903916F1-5DA1-C7DD-7E1B-BD545FA41FCC}"/>
+              </a:ext>
+            </a:extLst>
+          </p:cNvPr>
+          <p:cNvPicPr>
+            <a:picLocks noChangeAspect="1"/>
+          </p:cNvPicPr>
+          <p:nvPr/>
+        </p:nvPicPr>
+        <p:blipFill>
+          <a:blip r:embed="rId3">
+            <a:extLst>
+              <a:ext uri="{28A0092B-C50C-407E-A947-70E740481C1C}">
+                <a14:useLocalDpi xmlns:a14="http://schemas.microsoft.com/office/drawing/2010/main" val="0"/>
+              </a:ext>
+            </a:extLst>
+          </a:blip>
+          <a:srcRect t="82926"/>
+          <a:stretch>
+            <a:fillRect/>
+          </a:stretch>
+        </p:blipFill>
+        <p:spPr>
+          <a:xfrm>
+            <a:off x="838200" y="3979087"/>
+            <a:ext cx="8245555" cy="750760"/>
+          </a:xfrm>
+          <a:prstGeom prst="rect">
+            <a:avLst/>
+          </a:prstGeom>
+        </p:spPr>
+      </p:pic>
+      <p:sp>
+        <p:nvSpPr>
+          <p:cNvPr id="7" name="CasellaDiTesto 6">
+            <a:extLst>
+              <a:ext uri="{FF2B5EF4-FFF2-40B4-BE49-F238E27FC236}">
+                <a16:creationId xmlns:a16="http://schemas.microsoft.com/office/drawing/2014/main" id="{379B1FEA-0F11-F87A-67B9-D4E3776EA341}"/>
+              </a:ext>
+            </a:extLst>
+          </p:cNvPr>
+          <p:cNvSpPr txBox="1"/>
+          <p:nvPr/>
+        </p:nvSpPr>
+        <p:spPr>
+          <a:xfrm>
+            <a:off x="762000" y="4856946"/>
+            <a:ext cx="10287000" cy="954107"/>
+          </a:xfrm>
+          <a:prstGeom prst="rect">
+            <a:avLst/>
+          </a:prstGeom>
+          <a:noFill/>
+        </p:spPr>
+        <p:txBody>
+          <a:bodyPr wrap="square">
+            <a:spAutoFit/>
+          </a:bodyPr>
+          <a:lstStyle/>
+          <a:p>
+            <a:r>
+              <a:rPr lang="en-US" sz="2800" dirty="0"/>
+              <a:t>The final steps are always the same, though, as convergence is eventually reached.</a:t>
+            </a:r>
+          </a:p>
+        </p:txBody>
+      </p:sp>
+    </p:spTree>
+    <p:extLst>
+      <p:ext uri="{BB962C8B-B14F-4D97-AF65-F5344CB8AC3E}">
+        <p14:creationId xmlns:p14="http://schemas.microsoft.com/office/powerpoint/2010/main" val="1907456549"/>
+      </p:ext>
+    </p:extLst>
+  </p:cSld>
+  <p:clrMapOvr>
+    <a:masterClrMapping/>
+  </p:clrMapOvr>
+</p:sld>
+</file>
+
+<file path=ppt/slides/slide35.xml><?xml version="1.0" encoding="utf-8"?>
+<p:sld xmlns:a="http://schemas.openxmlformats.org/drawingml/2006/main" xmlns:r="http://schemas.openxmlformats.org/officeDocument/2006/relationships" xmlns:p="http://schemas.openxmlformats.org/presentationml/2006/main">
+  <p:cSld>
+    <p:spTree>
+      <p:nvGrpSpPr>
+        <p:cNvPr id="1" name="">
+          <a:extLst>
+            <a:ext uri="{FF2B5EF4-FFF2-40B4-BE49-F238E27FC236}">
+              <a16:creationId xmlns:a16="http://schemas.microsoft.com/office/drawing/2014/main" id="{AD850FD7-B30E-C391-ECF2-9F6433AA4389}"/>
+            </a:ext>
+          </a:extLst>
+        </p:cNvPr>
+        <p:cNvGrpSpPr/>
+        <p:nvPr/>
+      </p:nvGrpSpPr>
+      <p:grpSpPr>
+        <a:xfrm>
+          <a:off x="0" y="0"/>
+          <a:ext cx="0" cy="0"/>
+          <a:chOff x="0" y="0"/>
+          <a:chExt cx="0" cy="0"/>
+        </a:xfrm>
+      </p:grpSpPr>
+      <p:sp>
+        <p:nvSpPr>
+          <p:cNvPr id="10" name="Titolo 9">
+            <a:extLst>
+              <a:ext uri="{FF2B5EF4-FFF2-40B4-BE49-F238E27FC236}">
+                <a16:creationId xmlns:a16="http://schemas.microsoft.com/office/drawing/2014/main" id="{031586E8-EE9A-903C-4BA1-BBC4B8EF5FD9}"/>
+              </a:ext>
+            </a:extLst>
+          </p:cNvPr>
+          <p:cNvSpPr>
+            <a:spLocks noGrp="1"/>
+          </p:cNvSpPr>
+          <p:nvPr>
+            <p:ph type="title"/>
+          </p:nvPr>
+        </p:nvSpPr>
+        <p:spPr>
+          <a:xfrm>
+            <a:off x="762000" y="457200"/>
+            <a:ext cx="10287000" cy="538609"/>
+          </a:xfrm>
+        </p:spPr>
+        <p:txBody>
+          <a:bodyPr/>
+          <a:lstStyle/>
+          <a:p>
+            <a:r>
+              <a:rPr lang="en-GB" dirty="0">
+                <a:latin typeface="Arial Black" panose="020B0A04020102020204" pitchFamily="34" charset="0"/>
+              </a:rPr>
+              <a:t>Importance sampling c</a:t>
+            </a:r>
+            <a:r>
+              <a:rPr lang="en-GB" noProof="0" dirty="0" err="1">
+                <a:latin typeface="Arial Black" panose="020B0A04020102020204" pitchFamily="34" charset="0"/>
+              </a:rPr>
+              <a:t>oordinate</a:t>
+            </a:r>
+            <a:r>
+              <a:rPr lang="en-GB" noProof="0" dirty="0">
+                <a:latin typeface="Arial Black" panose="020B0A04020102020204" pitchFamily="34" charset="0"/>
+              </a:rPr>
+              <a:t> descent</a:t>
+            </a:r>
+          </a:p>
+        </p:txBody>
+      </p:sp>
+      <mc:AlternateContent xmlns:mc="http://schemas.openxmlformats.org/markup-compatibility/2006">
+        <mc:Choice xmlns:a14="http://schemas.microsoft.com/office/drawing/2010/main" Requires="a14">
+          <p:sp>
+            <p:nvSpPr>
+              <p:cNvPr id="2" name="CasellaDiTesto 1">
+                <a:extLst>
+                  <a:ext uri="{FF2B5EF4-FFF2-40B4-BE49-F238E27FC236}">
+                    <a16:creationId xmlns:a16="http://schemas.microsoft.com/office/drawing/2014/main" id="{9F4B4920-0019-9287-D4AB-06AF61EDE749}"/>
+                  </a:ext>
+                </a:extLst>
+              </p:cNvPr>
+              <p:cNvSpPr txBox="1"/>
+              <p:nvPr/>
+            </p:nvSpPr>
+            <p:spPr>
+              <a:xfrm>
+                <a:off x="762000" y="1447800"/>
+                <a:ext cx="10287000" cy="4064126"/>
+              </a:xfrm>
+              <a:prstGeom prst="rect">
+                <a:avLst/>
+              </a:prstGeom>
+              <a:noFill/>
+            </p:spPr>
+            <p:txBody>
+              <a:bodyPr wrap="square">
+                <a:spAutoFit/>
+              </a:bodyPr>
+              <a:lstStyle/>
+              <a:p>
+                <a:r>
+                  <a:rPr lang="en-US" sz="2800" dirty="0"/>
+                  <a:t>In this variation, the choice of which coordinate </a:t>
+                </a:r>
+                <a14:m>
+                  <m:oMath xmlns:m="http://schemas.openxmlformats.org/officeDocument/2006/math">
+                    <m:r>
+                      <a:rPr lang="it-IT" sz="2800" b="0" i="1" smtClean="0">
+                        <a:latin typeface="Cambria Math" panose="02040503050406030204" pitchFamily="18" charset="0"/>
+                      </a:rPr>
+                      <m:t>𝑖</m:t>
+                    </m:r>
+                  </m:oMath>
+                </a14:m>
+                <a:r>
+                  <a:rPr lang="en-US" sz="2800" dirty="0"/>
+                  <a:t> will be used for each step is still </a:t>
+                </a:r>
+                <a:r>
+                  <a:rPr lang="en-US" sz="2800" b="1" dirty="0">
+                    <a:solidFill>
+                      <a:srgbClr val="FF0000"/>
+                    </a:solidFill>
+                  </a:rPr>
+                  <a:t>random</a:t>
+                </a:r>
+                <a:r>
+                  <a:rPr lang="en-US" sz="2800" dirty="0"/>
+                  <a:t>, but the probability distribution </a:t>
+                </a:r>
+                <a14:m>
+                  <m:oMath xmlns:m="http://schemas.openxmlformats.org/officeDocument/2006/math">
+                    <m:r>
+                      <a:rPr lang="it-IT" sz="2800" b="0" i="1" smtClean="0">
+                        <a:latin typeface="Cambria Math" panose="02040503050406030204" pitchFamily="18" charset="0"/>
+                      </a:rPr>
+                      <m:t>𝑝</m:t>
+                    </m:r>
+                    <m:r>
+                      <a:rPr lang="it-IT" sz="2800" b="0" i="1" smtClean="0">
+                        <a:latin typeface="Cambria Math" panose="02040503050406030204" pitchFamily="18" charset="0"/>
+                      </a:rPr>
+                      <m:t> </m:t>
+                    </m:r>
+                  </m:oMath>
+                </a14:m>
+                <a:r>
+                  <a:rPr lang="en-US" sz="2800" dirty="0"/>
+                  <a:t>is based on the </a:t>
+                </a:r>
+                <a:r>
+                  <a:rPr lang="en-US" sz="2800" b="1" dirty="0">
+                    <a:solidFill>
+                      <a:srgbClr val="FF0000"/>
+                    </a:solidFill>
+                  </a:rPr>
+                  <a:t>smoothness constant </a:t>
+                </a:r>
+                <a14:m>
+                  <m:oMath xmlns:m="http://schemas.openxmlformats.org/officeDocument/2006/math">
+                    <m:sSub>
+                      <m:sSubPr>
+                        <m:ctrlPr>
+                          <a:rPr lang="en-US" sz="2800" i="1" smtClean="0">
+                            <a:latin typeface="Cambria Math" panose="02040503050406030204" pitchFamily="18" charset="0"/>
+                          </a:rPr>
+                        </m:ctrlPr>
+                      </m:sSubPr>
+                      <m:e>
+                        <m:r>
+                          <a:rPr lang="it-IT" sz="2800" b="0" i="1" smtClean="0">
+                            <a:latin typeface="Cambria Math" panose="02040503050406030204" pitchFamily="18" charset="0"/>
+                          </a:rPr>
+                          <m:t>𝐿</m:t>
+                        </m:r>
+                      </m:e>
+                      <m:sub>
+                        <m:r>
+                          <a:rPr lang="it-IT" sz="2800" b="0" i="1" smtClean="0">
+                            <a:latin typeface="Cambria Math" panose="02040503050406030204" pitchFamily="18" charset="0"/>
+                          </a:rPr>
+                          <m:t>𝑖</m:t>
+                        </m:r>
+                        <m:r>
+                          <a:rPr lang="it-IT" sz="2800" b="0" i="1" smtClean="0">
+                            <a:latin typeface="Cambria Math" panose="02040503050406030204" pitchFamily="18" charset="0"/>
+                          </a:rPr>
+                          <m:t> </m:t>
+                        </m:r>
+                      </m:sub>
+                    </m:sSub>
+                  </m:oMath>
+                </a14:m>
+                <a:r>
+                  <a:rPr lang="en-US" sz="2800" dirty="0"/>
+                  <a:t>associated with every coordinate:</a:t>
+                </a:r>
+              </a:p>
+              <a:p>
+                <a:pPr/>
+                <a14:m>
+                  <m:oMathPara xmlns:m="http://schemas.openxmlformats.org/officeDocument/2006/math">
+                    <m:oMathParaPr>
+                      <m:jc m:val="left"/>
+                    </m:oMathParaPr>
+                    <m:oMath xmlns:m="http://schemas.openxmlformats.org/officeDocument/2006/math">
+                      <m:sSub>
+                        <m:sSubPr>
+                          <m:ctrlPr>
+                            <a:rPr lang="it-IT" sz="2800" b="0" i="1" smtClean="0">
+                              <a:latin typeface="Cambria Math" panose="02040503050406030204" pitchFamily="18" charset="0"/>
+                            </a:rPr>
+                          </m:ctrlPr>
+                        </m:sSubPr>
+                        <m:e>
+                          <m:r>
+                            <a:rPr lang="it-IT" sz="2800" b="0" i="1" smtClean="0">
+                              <a:latin typeface="Cambria Math" panose="02040503050406030204" pitchFamily="18" charset="0"/>
+                            </a:rPr>
+                            <m:t>𝑝</m:t>
+                          </m:r>
+                        </m:e>
+                        <m:sub>
+                          <m:r>
+                            <a:rPr lang="it-IT" sz="2800" b="0" i="1" smtClean="0">
+                              <a:latin typeface="Cambria Math" panose="02040503050406030204" pitchFamily="18" charset="0"/>
+                            </a:rPr>
+                            <m:t>𝑖</m:t>
+                          </m:r>
+                        </m:sub>
+                      </m:sSub>
+                      <m:r>
+                        <a:rPr lang="it-IT" sz="2800" b="0" i="1" smtClean="0">
+                          <a:latin typeface="Cambria Math" panose="02040503050406030204" pitchFamily="18" charset="0"/>
+                        </a:rPr>
+                        <m:t>= </m:t>
+                      </m:r>
+                      <m:f>
+                        <m:fPr>
+                          <m:ctrlPr>
+                            <a:rPr lang="it-IT" sz="2800" b="0" i="1" smtClean="0">
+                              <a:latin typeface="Cambria Math" panose="02040503050406030204" pitchFamily="18" charset="0"/>
+                            </a:rPr>
+                          </m:ctrlPr>
+                        </m:fPr>
+                        <m:num>
+                          <m:sSub>
+                            <m:sSubPr>
+                              <m:ctrlPr>
+                                <a:rPr lang="it-IT" sz="2800" b="0" i="1" smtClean="0">
+                                  <a:latin typeface="Cambria Math" panose="02040503050406030204" pitchFamily="18" charset="0"/>
+                                </a:rPr>
+                              </m:ctrlPr>
+                            </m:sSubPr>
+                            <m:e>
+                              <m:r>
+                                <a:rPr lang="it-IT" sz="2800" b="0" i="1" smtClean="0">
+                                  <a:latin typeface="Cambria Math" panose="02040503050406030204" pitchFamily="18" charset="0"/>
+                                </a:rPr>
+                                <m:t>𝐿</m:t>
+                              </m:r>
+                            </m:e>
+                            <m:sub>
+                              <m:r>
+                                <a:rPr lang="it-IT" sz="2800" b="0" i="1" smtClean="0">
+                                  <a:latin typeface="Cambria Math" panose="02040503050406030204" pitchFamily="18" charset="0"/>
+                                </a:rPr>
+                                <m:t>𝑖</m:t>
+                              </m:r>
+                            </m:sub>
+                          </m:sSub>
+                        </m:num>
+                        <m:den>
+                          <m:nary>
+                            <m:naryPr>
+                              <m:chr m:val="∑"/>
+                              <m:ctrlPr>
+                                <a:rPr lang="it-IT" sz="2800" b="0" i="1" smtClean="0">
+                                  <a:latin typeface="Cambria Math" panose="02040503050406030204" pitchFamily="18" charset="0"/>
+                                </a:rPr>
+                              </m:ctrlPr>
+                            </m:naryPr>
+                            <m:sub>
+                              <m:r>
+                                <m:rPr>
+                                  <m:brk m:alnAt="23"/>
+                                </m:rPr>
+                                <a:rPr lang="it-IT" sz="2800" b="0" i="1" smtClean="0">
+                                  <a:latin typeface="Cambria Math" panose="02040503050406030204" pitchFamily="18" charset="0"/>
+                                </a:rPr>
+                                <m:t>𝑗</m:t>
+                              </m:r>
+                              <m:r>
+                                <a:rPr lang="it-IT" sz="2800" b="0" i="1" smtClean="0">
+                                  <a:latin typeface="Cambria Math" panose="02040503050406030204" pitchFamily="18" charset="0"/>
+                                </a:rPr>
+                                <m:t>=1</m:t>
+                              </m:r>
+                            </m:sub>
+                            <m:sup>
+                              <m:r>
+                                <a:rPr lang="it-IT" sz="2800" b="0" i="1" smtClean="0">
+                                  <a:latin typeface="Cambria Math" panose="02040503050406030204" pitchFamily="18" charset="0"/>
+                                </a:rPr>
+                                <m:t>𝑛</m:t>
+                              </m:r>
+                            </m:sup>
+                            <m:e>
+                              <m:sSub>
+                                <m:sSubPr>
+                                  <m:ctrlPr>
+                                    <a:rPr lang="it-IT" sz="2800" b="0" i="1" smtClean="0">
+                                      <a:latin typeface="Cambria Math" panose="02040503050406030204" pitchFamily="18" charset="0"/>
+                                    </a:rPr>
+                                  </m:ctrlPr>
+                                </m:sSubPr>
+                                <m:e>
+                                  <m:r>
+                                    <a:rPr lang="it-IT" sz="2800" b="0" i="1" smtClean="0">
+                                      <a:latin typeface="Cambria Math" panose="02040503050406030204" pitchFamily="18" charset="0"/>
+                                    </a:rPr>
+                                    <m:t>𝐿</m:t>
+                                  </m:r>
+                                </m:e>
+                                <m:sub>
+                                  <m:r>
+                                    <a:rPr lang="it-IT" sz="2800" b="0" i="1" smtClean="0">
+                                      <a:latin typeface="Cambria Math" panose="02040503050406030204" pitchFamily="18" charset="0"/>
+                                    </a:rPr>
+                                    <m:t>𝑗</m:t>
+                                  </m:r>
+                                </m:sub>
+                              </m:sSub>
+                            </m:e>
+                          </m:nary>
+                        </m:den>
+                      </m:f>
+                    </m:oMath>
+                  </m:oMathPara>
+                </a14:m>
+                <a:endParaRPr lang="en-US" sz="2800" dirty="0"/>
+              </a:p>
+              <a:p>
+                <a:pPr/>
+                <a:endParaRPr lang="en-US" sz="2800" dirty="0"/>
+              </a:p>
+              <a:p>
+                <a:pPr/>
+                <a:r>
+                  <a:rPr lang="en-US" sz="2800" dirty="0"/>
+                  <a:t>With the choice being still randomized, the number of steps necessary for reaching the optimum change at every execution.</a:t>
+                </a:r>
+              </a:p>
+            </p:txBody>
+          </p:sp>
+        </mc:Choice>
+        <mc:Fallback>
+          <p:sp>
+            <p:nvSpPr>
+              <p:cNvPr id="2" name="CasellaDiTesto 1">
+                <a:extLst>
+                  <a:ext uri="{FF2B5EF4-FFF2-40B4-BE49-F238E27FC236}">
+                    <a16:creationId xmlns:a16="http://schemas.microsoft.com/office/drawing/2014/main" id="{9F4B4920-0019-9287-D4AB-06AF61EDE749}"/>
+                  </a:ext>
+                </a:extLst>
+              </p:cNvPr>
+              <p:cNvSpPr txBox="1">
+                <a:spLocks noRot="1" noChangeAspect="1" noMove="1" noResize="1" noEditPoints="1" noAdjustHandles="1" noChangeArrowheads="1" noChangeShapeType="1" noTextEdit="1"/>
+              </p:cNvSpPr>
+              <p:nvPr/>
+            </p:nvSpPr>
+            <p:spPr>
+              <a:xfrm>
+                <a:off x="762000" y="1447800"/>
+                <a:ext cx="10287000" cy="4064126"/>
+              </a:xfrm>
+              <a:prstGeom prst="rect">
+                <a:avLst/>
+              </a:prstGeom>
+              <a:blipFill>
+                <a:blip r:embed="rId2"/>
+                <a:stretch>
+                  <a:fillRect l="-1185" t="-1652" r="-1896" b="-3153"/>
+                </a:stretch>
+              </a:blipFill>
+            </p:spPr>
+            <p:txBody>
+              <a:bodyPr/>
+              <a:lstStyle/>
+              <a:p>
+                <a:r>
+                  <a:rPr lang="it-IT">
+                    <a:noFill/>
+                  </a:rPr>
+                  <a:t> </a:t>
+                </a:r>
+              </a:p>
+            </p:txBody>
+          </p:sp>
+        </mc:Fallback>
+      </mc:AlternateContent>
+    </p:spTree>
+    <p:extLst>
+      <p:ext uri="{BB962C8B-B14F-4D97-AF65-F5344CB8AC3E}">
+        <p14:creationId xmlns:p14="http://schemas.microsoft.com/office/powerpoint/2010/main" val="438545480"/>
+      </p:ext>
+    </p:extLst>
+  </p:cSld>
+  <p:clrMapOvr>
+    <a:masterClrMapping/>
+  </p:clrMapOvr>
+</p:sld>
+</file>
+
+<file path=ppt/slides/slide36.xml><?xml version="1.0" encoding="utf-8"?>
+<p:sld xmlns:a="http://schemas.openxmlformats.org/drawingml/2006/main" xmlns:r="http://schemas.openxmlformats.org/officeDocument/2006/relationships" xmlns:p="http://schemas.openxmlformats.org/presentationml/2006/main">
+  <p:cSld>
+    <p:spTree>
+      <p:nvGrpSpPr>
+        <p:cNvPr id="1" name="">
+          <a:extLst>
+            <a:ext uri="{FF2B5EF4-FFF2-40B4-BE49-F238E27FC236}">
+              <a16:creationId xmlns:a16="http://schemas.microsoft.com/office/drawing/2014/main" id="{14CB45F4-D347-D7AC-392E-763F8EBDA478}"/>
+            </a:ext>
+          </a:extLst>
+        </p:cNvPr>
+        <p:cNvGrpSpPr/>
+        <p:nvPr/>
+      </p:nvGrpSpPr>
+      <p:grpSpPr>
+        <a:xfrm>
+          <a:off x="0" y="0"/>
+          <a:ext cx="0" cy="0"/>
+          <a:chOff x="0" y="0"/>
+          <a:chExt cx="0" cy="0"/>
+        </a:xfrm>
+      </p:grpSpPr>
+      <p:sp>
+        <p:nvSpPr>
+          <p:cNvPr id="10" name="Titolo 9">
+            <a:extLst>
+              <a:ext uri="{FF2B5EF4-FFF2-40B4-BE49-F238E27FC236}">
+                <a16:creationId xmlns:a16="http://schemas.microsoft.com/office/drawing/2014/main" id="{7890310C-1465-1BB6-C3C1-16C81E684BAA}"/>
+              </a:ext>
+            </a:extLst>
+          </p:cNvPr>
+          <p:cNvSpPr>
+            <a:spLocks noGrp="1"/>
+          </p:cNvSpPr>
+          <p:nvPr>
+            <p:ph type="title"/>
+          </p:nvPr>
+        </p:nvSpPr>
+        <p:spPr>
+          <a:xfrm>
+            <a:off x="762000" y="457200"/>
+            <a:ext cx="10287000" cy="1077218"/>
+          </a:xfrm>
+        </p:spPr>
+        <p:txBody>
+          <a:bodyPr/>
+          <a:lstStyle/>
+          <a:p>
+            <a:r>
+              <a:rPr lang="en-GB" dirty="0">
+                <a:latin typeface="Arial Black" panose="020B0A04020102020204" pitchFamily="34" charset="0"/>
+              </a:rPr>
+              <a:t>Steepest c</a:t>
+            </a:r>
+            <a:r>
+              <a:rPr lang="en-GB" noProof="0" dirty="0" err="1">
+                <a:latin typeface="Arial Black" panose="020B0A04020102020204" pitchFamily="34" charset="0"/>
+              </a:rPr>
+              <a:t>oordinate</a:t>
+            </a:r>
+            <a:r>
+              <a:rPr lang="en-GB" noProof="0" dirty="0">
+                <a:latin typeface="Arial Black" panose="020B0A04020102020204" pitchFamily="34" charset="0"/>
+              </a:rPr>
+              <a:t> descent</a:t>
+            </a:r>
+          </a:p>
+        </p:txBody>
+      </p:sp>
+      <mc:AlternateContent xmlns:mc="http://schemas.openxmlformats.org/markup-compatibility/2006">
+        <mc:Choice xmlns:a14="http://schemas.microsoft.com/office/drawing/2010/main" Requires="a14">
+          <p:sp>
+            <p:nvSpPr>
+              <p:cNvPr id="4" name="CasellaDiTesto 3">
+                <a:extLst>
+                  <a:ext uri="{FF2B5EF4-FFF2-40B4-BE49-F238E27FC236}">
+                    <a16:creationId xmlns:a16="http://schemas.microsoft.com/office/drawing/2014/main" id="{B7E17309-62F6-6FAF-76C3-890E31FE712E}"/>
+                  </a:ext>
+                </a:extLst>
+              </p:cNvPr>
+              <p:cNvSpPr txBox="1"/>
+              <p:nvPr/>
+            </p:nvSpPr>
+            <p:spPr>
+              <a:xfrm>
+                <a:off x="762000" y="1600200"/>
+                <a:ext cx="10287000" cy="4401205"/>
+              </a:xfrm>
+              <a:prstGeom prst="rect">
+                <a:avLst/>
+              </a:prstGeom>
+              <a:noFill/>
+            </p:spPr>
+            <p:txBody>
+              <a:bodyPr wrap="square">
+                <a:spAutoFit/>
+              </a:bodyPr>
+              <a:lstStyle/>
+              <a:p>
+                <a:r>
+                  <a:rPr lang="en-US" sz="2800" dirty="0"/>
+                  <a:t>This method, unlike the previous two, is </a:t>
+                </a:r>
+                <a:r>
+                  <a:rPr lang="en-US" sz="2800" b="1" dirty="0">
+                    <a:solidFill>
+                      <a:srgbClr val="FF0000"/>
+                    </a:solidFill>
+                  </a:rPr>
+                  <a:t>deterministic</a:t>
+                </a:r>
+                <a:r>
+                  <a:rPr lang="en-US" sz="2800" dirty="0"/>
+                  <a:t>: the direction chosen for each iteration is the one with the </a:t>
+                </a:r>
+                <a:r>
+                  <a:rPr lang="en-US" sz="2800" b="1" dirty="0">
+                    <a:solidFill>
+                      <a:srgbClr val="FF0000"/>
+                    </a:solidFill>
+                  </a:rPr>
+                  <a:t>largest absolute value </a:t>
+                </a:r>
+                <a:r>
+                  <a:rPr lang="en-US" sz="2800" dirty="0"/>
+                  <a:t>of the </a:t>
+                </a:r>
+                <a:r>
+                  <a:rPr lang="en-US" sz="2800" b="1" dirty="0">
+                    <a:solidFill>
+                      <a:srgbClr val="FF0000"/>
+                    </a:solidFill>
+                  </a:rPr>
+                  <a:t>gradient</a:t>
+                </a:r>
+                <a:r>
+                  <a:rPr lang="en-US" sz="2800" dirty="0"/>
+                  <a:t>.</a:t>
+                </a:r>
+              </a:p>
+              <a:p>
+                <a:endParaRPr lang="en-US" sz="2800" dirty="0"/>
+              </a:p>
+              <a:p>
+                <a:pPr/>
+                <a14:m>
+                  <m:oMathPara xmlns:m="http://schemas.openxmlformats.org/officeDocument/2006/math">
+                    <m:oMathParaPr>
+                      <m:jc m:val="left"/>
+                    </m:oMathParaPr>
+                    <m:oMath xmlns:m="http://schemas.openxmlformats.org/officeDocument/2006/math">
+                      <m:sSub>
+                        <m:sSubPr>
+                          <m:ctrlPr>
+                            <a:rPr lang="it-IT" sz="2800" b="0" i="1" smtClean="0">
+                              <a:latin typeface="Cambria Math" panose="02040503050406030204" pitchFamily="18" charset="0"/>
+                            </a:rPr>
+                          </m:ctrlPr>
+                        </m:sSubPr>
+                        <m:e>
+                          <m:r>
+                            <a:rPr lang="it-IT" sz="2800" b="0" i="1" smtClean="0">
+                              <a:latin typeface="Cambria Math" panose="02040503050406030204" pitchFamily="18" charset="0"/>
+                            </a:rPr>
+                            <m:t>𝑖</m:t>
+                          </m:r>
+                        </m:e>
+                        <m:sub>
+                          <m:r>
+                            <a:rPr lang="it-IT" sz="2800" b="0" i="1" smtClean="0">
+                              <a:latin typeface="Cambria Math" panose="02040503050406030204" pitchFamily="18" charset="0"/>
+                            </a:rPr>
+                            <m:t>𝑡</m:t>
+                          </m:r>
+                        </m:sub>
+                      </m:sSub>
+                      <m:r>
+                        <a:rPr lang="it-IT" sz="2800" b="0" i="1" smtClean="0">
+                          <a:latin typeface="Cambria Math" panose="02040503050406030204" pitchFamily="18" charset="0"/>
+                        </a:rPr>
+                        <m:t>=</m:t>
+                      </m:r>
+                      <m:r>
+                        <a:rPr lang="it-IT" sz="2800" b="0" i="1" smtClean="0">
+                          <a:latin typeface="Cambria Math" panose="02040503050406030204" pitchFamily="18" charset="0"/>
+                        </a:rPr>
+                        <m:t>𝑎𝑟𝑔𝑀𝑎𝑥</m:t>
+                      </m:r>
+                      <m:d>
+                        <m:dPr>
+                          <m:begChr m:val="|"/>
+                          <m:endChr m:val="|"/>
+                          <m:ctrlPr>
+                            <a:rPr lang="it-IT" sz="2800" b="0" i="1" smtClean="0">
+                              <a:latin typeface="Cambria Math" panose="02040503050406030204" pitchFamily="18" charset="0"/>
+                            </a:rPr>
+                          </m:ctrlPr>
+                        </m:dPr>
+                        <m:e>
+                          <m:sSub>
+                            <m:sSubPr>
+                              <m:ctrlPr>
+                                <a:rPr lang="it-IT" sz="2800" b="0" i="1" smtClean="0">
+                                  <a:latin typeface="Cambria Math" panose="02040503050406030204" pitchFamily="18" charset="0"/>
+                                </a:rPr>
+                              </m:ctrlPr>
+                            </m:sSubPr>
+                            <m:e>
+                              <m:r>
+                                <m:rPr>
+                                  <m:sty m:val="p"/>
+                                </m:rPr>
+                                <a:rPr lang="it-IT" sz="2800" b="0" i="1" smtClean="0">
+                                  <a:latin typeface="Cambria Math" panose="02040503050406030204" pitchFamily="18" charset="0"/>
+                                  <a:ea typeface="Cambria Math" panose="02040503050406030204" pitchFamily="18" charset="0"/>
+                                </a:rPr>
+                                <m:t>∇</m:t>
+                              </m:r>
+                            </m:e>
+                            <m:sub>
+                              <m:r>
+                                <a:rPr lang="it-IT" sz="2800" b="0" i="1" smtClean="0">
+                                  <a:latin typeface="Cambria Math" panose="02040503050406030204" pitchFamily="18" charset="0"/>
+                                </a:rPr>
+                                <m:t>𝑖</m:t>
+                              </m:r>
+                            </m:sub>
+                          </m:sSub>
+                          <m:r>
+                            <a:rPr lang="it-IT" sz="2800" b="0" i="1" smtClean="0">
+                              <a:latin typeface="Cambria Math" panose="02040503050406030204" pitchFamily="18" charset="0"/>
+                              <a:ea typeface="Cambria Math" panose="02040503050406030204" pitchFamily="18" charset="0"/>
+                            </a:rPr>
+                            <m:t>𝑓</m:t>
+                          </m:r>
+                          <m:r>
+                            <a:rPr lang="it-IT" sz="2800" b="0" i="1" smtClean="0">
+                              <a:latin typeface="Cambria Math" panose="02040503050406030204" pitchFamily="18" charset="0"/>
+                              <a:ea typeface="Cambria Math" panose="02040503050406030204" pitchFamily="18" charset="0"/>
+                            </a:rPr>
+                            <m:t>(</m:t>
+                          </m:r>
+                          <m:sSub>
+                            <m:sSubPr>
+                              <m:ctrlPr>
+                                <a:rPr lang="it-IT" sz="2800" b="0" i="1" smtClean="0">
+                                  <a:latin typeface="Cambria Math" panose="02040503050406030204" pitchFamily="18" charset="0"/>
+                                  <a:ea typeface="Cambria Math" panose="02040503050406030204" pitchFamily="18" charset="0"/>
+                                </a:rPr>
+                              </m:ctrlPr>
+                            </m:sSubPr>
+                            <m:e>
+                              <m:r>
+                                <a:rPr lang="it-IT" sz="2800" b="0" i="1" smtClean="0">
+                                  <a:latin typeface="Cambria Math" panose="02040503050406030204" pitchFamily="18" charset="0"/>
+                                  <a:ea typeface="Cambria Math" panose="02040503050406030204" pitchFamily="18" charset="0"/>
+                                </a:rPr>
+                                <m:t>𝑥</m:t>
+                              </m:r>
+                            </m:e>
+                            <m:sub>
+                              <m:r>
+                                <a:rPr lang="it-IT" sz="2800" b="0" i="1" smtClean="0">
+                                  <a:latin typeface="Cambria Math" panose="02040503050406030204" pitchFamily="18" charset="0"/>
+                                  <a:ea typeface="Cambria Math" panose="02040503050406030204" pitchFamily="18" charset="0"/>
+                                </a:rPr>
+                                <m:t>𝑡</m:t>
+                              </m:r>
+                            </m:sub>
+                          </m:sSub>
+                          <m:r>
+                            <a:rPr lang="it-IT" sz="2800" b="0" i="1" smtClean="0">
+                              <a:latin typeface="Cambria Math" panose="02040503050406030204" pitchFamily="18" charset="0"/>
+                              <a:ea typeface="Cambria Math" panose="02040503050406030204" pitchFamily="18" charset="0"/>
+                            </a:rPr>
+                            <m:t>)</m:t>
+                          </m:r>
+                        </m:e>
+                      </m:d>
+                    </m:oMath>
+                  </m:oMathPara>
+                </a14:m>
+                <a:endParaRPr lang="en-US" sz="2800" dirty="0"/>
+              </a:p>
+              <a:p>
+                <a:pPr/>
+                <a:endParaRPr lang="en-US" sz="2800" dirty="0"/>
+              </a:p>
+              <a:p>
+                <a:pPr/>
+                <a:r>
+                  <a:rPr lang="en-US" sz="2800" dirty="0"/>
+                  <a:t>In this problem, the optimum value with this method is always reached in about 26 steps.</a:t>
+                </a:r>
+              </a:p>
+              <a:p>
+                <a:endParaRPr lang="en-US" sz="2800" dirty="0"/>
+              </a:p>
+              <a:p>
+                <a:endParaRPr lang="en-US" sz="2800" dirty="0"/>
+              </a:p>
+            </p:txBody>
+          </p:sp>
+        </mc:Choice>
+        <mc:Fallback>
+          <p:sp>
+            <p:nvSpPr>
+              <p:cNvPr id="4" name="CasellaDiTesto 3">
+                <a:extLst>
+                  <a:ext uri="{FF2B5EF4-FFF2-40B4-BE49-F238E27FC236}">
+                    <a16:creationId xmlns:a16="http://schemas.microsoft.com/office/drawing/2014/main" id="{B7E17309-62F6-6FAF-76C3-890E31FE712E}"/>
+                  </a:ext>
+                </a:extLst>
+              </p:cNvPr>
+              <p:cNvSpPr txBox="1">
+                <a:spLocks noRot="1" noChangeAspect="1" noMove="1" noResize="1" noEditPoints="1" noAdjustHandles="1" noChangeArrowheads="1" noChangeShapeType="1" noTextEdit="1"/>
+              </p:cNvSpPr>
+              <p:nvPr/>
+            </p:nvSpPr>
+            <p:spPr>
+              <a:xfrm>
+                <a:off x="762000" y="1600200"/>
+                <a:ext cx="10287000" cy="4401205"/>
+              </a:xfrm>
+              <a:prstGeom prst="rect">
+                <a:avLst/>
+              </a:prstGeom>
+              <a:blipFill>
+                <a:blip r:embed="rId2"/>
+                <a:stretch>
+                  <a:fillRect l="-1185" t="-1526"/>
+                </a:stretch>
+              </a:blipFill>
+            </p:spPr>
+            <p:txBody>
+              <a:bodyPr/>
+              <a:lstStyle/>
+              <a:p>
+                <a:r>
+                  <a:rPr lang="it-IT">
+                    <a:noFill/>
+                  </a:rPr>
+                  <a:t> </a:t>
+                </a:r>
+              </a:p>
+            </p:txBody>
+          </p:sp>
+        </mc:Fallback>
+      </mc:AlternateContent>
+    </p:spTree>
+    <p:extLst>
+      <p:ext uri="{BB962C8B-B14F-4D97-AF65-F5344CB8AC3E}">
+        <p14:creationId xmlns:p14="http://schemas.microsoft.com/office/powerpoint/2010/main" val="2955788668"/>
+      </p:ext>
+    </p:extLst>
+  </p:cSld>
+  <p:clrMapOvr>
+    <a:masterClrMapping/>
+  </p:clrMapOvr>
+</p:sld>
+</file>
+
+<file path=ppt/slides/slide37.xml><?xml version="1.0" encoding="utf-8"?>
+<p:sld xmlns:a="http://schemas.openxmlformats.org/drawingml/2006/main" xmlns:r="http://schemas.openxmlformats.org/officeDocument/2006/relationships" xmlns:p="http://schemas.openxmlformats.org/presentationml/2006/main">
+  <p:cSld>
+    <p:spTree>
+      <p:nvGrpSpPr>
+        <p:cNvPr id="1" name="">
+          <a:extLst>
+            <a:ext uri="{FF2B5EF4-FFF2-40B4-BE49-F238E27FC236}">
+              <a16:creationId xmlns:a16="http://schemas.microsoft.com/office/drawing/2014/main" id="{9977519D-AC93-C92C-1CD0-888CB3A06D99}"/>
+            </a:ext>
+          </a:extLst>
+        </p:cNvPr>
+        <p:cNvGrpSpPr/>
+        <p:nvPr/>
+      </p:nvGrpSpPr>
+      <p:grpSpPr>
+        <a:xfrm>
+          <a:off x="0" y="0"/>
+          <a:ext cx="0" cy="0"/>
+          <a:chOff x="0" y="0"/>
+          <a:chExt cx="0" cy="0"/>
+        </a:xfrm>
+      </p:grpSpPr>
+      <p:sp>
+        <p:nvSpPr>
+          <p:cNvPr id="10" name="Titolo 9">
+            <a:extLst>
+              <a:ext uri="{FF2B5EF4-FFF2-40B4-BE49-F238E27FC236}">
+                <a16:creationId xmlns:a16="http://schemas.microsoft.com/office/drawing/2014/main" id="{87F6892E-72FA-1B3A-4E94-DAC2BE34D699}"/>
+              </a:ext>
+            </a:extLst>
+          </p:cNvPr>
+          <p:cNvSpPr>
+            <a:spLocks noGrp="1"/>
+          </p:cNvSpPr>
+          <p:nvPr>
+            <p:ph type="title"/>
+          </p:nvPr>
+        </p:nvSpPr>
+        <p:spPr>
+          <a:xfrm>
+            <a:off x="762000" y="457200"/>
+            <a:ext cx="10287000" cy="538609"/>
+          </a:xfrm>
+        </p:spPr>
+        <p:txBody>
+          <a:bodyPr/>
+          <a:lstStyle/>
+          <a:p>
+            <a:r>
+              <a:rPr lang="en-GB" dirty="0">
+                <a:latin typeface="Arial Black" panose="020B0A04020102020204" pitchFamily="34" charset="0"/>
+              </a:rPr>
+              <a:t>Comparing the coordinate techniques</a:t>
+            </a:r>
+            <a:endParaRPr lang="en-GB" noProof="0" dirty="0">
+              <a:latin typeface="Arial Black" panose="020B0A04020102020204" pitchFamily="34" charset="0"/>
+            </a:endParaRPr>
+          </a:p>
+        </p:txBody>
+      </p:sp>
+      <p:sp>
+        <p:nvSpPr>
+          <p:cNvPr id="4" name="CasellaDiTesto 3">
+            <a:extLst>
+              <a:ext uri="{FF2B5EF4-FFF2-40B4-BE49-F238E27FC236}">
+                <a16:creationId xmlns:a16="http://schemas.microsoft.com/office/drawing/2014/main" id="{A79574F0-925A-DBC4-7C30-2DDC510C91D0}"/>
+              </a:ext>
+            </a:extLst>
+          </p:cNvPr>
+          <p:cNvSpPr txBox="1"/>
+          <p:nvPr/>
+        </p:nvSpPr>
+        <p:spPr>
+          <a:xfrm>
+            <a:off x="5867400" y="1466195"/>
+            <a:ext cx="5181600" cy="3970318"/>
+          </a:xfrm>
+          <a:prstGeom prst="rect">
+            <a:avLst/>
+          </a:prstGeom>
+          <a:noFill/>
+        </p:spPr>
+        <p:txBody>
+          <a:bodyPr wrap="square">
+            <a:spAutoFit/>
+          </a:bodyPr>
+          <a:lstStyle/>
+          <a:p>
+            <a:r>
+              <a:rPr lang="en-US" sz="2800" dirty="0"/>
+              <a:t>All three converge in less than 40 steps.</a:t>
+            </a:r>
+          </a:p>
+          <a:p>
+            <a:pPr marL="457200" indent="-457200">
+              <a:buFont typeface="Arial" panose="020B0604020202020204" pitchFamily="34" charset="0"/>
+              <a:buChar char="•"/>
+            </a:pPr>
+            <a:r>
+              <a:rPr lang="en-US" sz="2800" b="1" dirty="0">
+                <a:solidFill>
+                  <a:srgbClr val="00B050"/>
+                </a:solidFill>
+              </a:rPr>
+              <a:t>Steepest Coordinate</a:t>
+            </a:r>
+            <a:r>
+              <a:rPr lang="en-US" sz="2800" dirty="0"/>
+              <a:t> is by far the fastest method;</a:t>
+            </a:r>
+          </a:p>
+          <a:p>
+            <a:pPr marL="457200" indent="-457200">
+              <a:buFont typeface="Arial" panose="020B0604020202020204" pitchFamily="34" charset="0"/>
+              <a:buChar char="•"/>
+            </a:pPr>
+            <a:r>
+              <a:rPr lang="en-US" sz="2800" b="1" dirty="0">
+                <a:solidFill>
+                  <a:schemeClr val="tx2"/>
+                </a:solidFill>
+              </a:rPr>
+              <a:t>Importance Sampling </a:t>
+            </a:r>
+            <a:r>
+              <a:rPr lang="en-US" sz="2800" dirty="0"/>
+              <a:t>is slower;</a:t>
+            </a:r>
+          </a:p>
+          <a:p>
+            <a:pPr marL="457200" indent="-457200">
+              <a:buFont typeface="Arial" panose="020B0604020202020204" pitchFamily="34" charset="0"/>
+              <a:buChar char="•"/>
+            </a:pPr>
+            <a:r>
+              <a:rPr lang="en-US" sz="2800" b="1" dirty="0">
+                <a:solidFill>
+                  <a:srgbClr val="FF0000"/>
+                </a:solidFill>
+              </a:rPr>
+              <a:t>Random Coordinate </a:t>
+            </a:r>
+            <a:r>
+              <a:rPr lang="en-US" sz="2800" dirty="0"/>
+              <a:t>has the most variance in its results.</a:t>
+            </a:r>
+          </a:p>
+        </p:txBody>
+      </p:sp>
+      <p:pic>
+        <p:nvPicPr>
+          <p:cNvPr id="6" name="Immagine 5">
+            <a:extLst>
+              <a:ext uri="{FF2B5EF4-FFF2-40B4-BE49-F238E27FC236}">
+                <a16:creationId xmlns:a16="http://schemas.microsoft.com/office/drawing/2014/main" id="{A4BD3B59-B383-7A6F-5371-0FACAAA23802}"/>
+              </a:ext>
+            </a:extLst>
+          </p:cNvPr>
+          <p:cNvPicPr>
+            <a:picLocks noChangeAspect="1"/>
+          </p:cNvPicPr>
+          <p:nvPr/>
+        </p:nvPicPr>
+        <p:blipFill>
+          <a:blip r:embed="rId3"/>
+          <a:stretch>
+            <a:fillRect/>
+          </a:stretch>
+        </p:blipFill>
+        <p:spPr>
+          <a:xfrm>
+            <a:off x="762000" y="1466195"/>
+            <a:ext cx="4734725" cy="4566588"/>
+          </a:xfrm>
+          <a:prstGeom prst="rect">
+            <a:avLst/>
+          </a:prstGeom>
+        </p:spPr>
+      </p:pic>
+    </p:spTree>
+    <p:extLst>
+      <p:ext uri="{BB962C8B-B14F-4D97-AF65-F5344CB8AC3E}">
+        <p14:creationId xmlns:p14="http://schemas.microsoft.com/office/powerpoint/2010/main" val="3910780867"/>
       </p:ext>
     </p:extLst>
   </p:cSld>
@@ -10127,4 +12276,319 @@
   <a:objectDefaults/>
   <a:extraClrSchemeLst/>
 </a:theme>
+</file>
+
+<file path=ppt/theme/theme2.xml><?xml version="1.0" encoding="utf-8"?>
+<a:theme xmlns:a="http://schemas.openxmlformats.org/drawingml/2006/main" name="Tema di Office">
+  <a:themeElements>
+    <a:clrScheme name="Office">
+      <a:dk1>
+        <a:sysClr val="windowText" lastClr="000000"/>
+      </a:dk1>
+      <a:lt1>
+        <a:sysClr val="window" lastClr="FFFFFF"/>
+      </a:lt1>
+      <a:dk2>
+        <a:srgbClr val="0E2841"/>
+      </a:dk2>
+      <a:lt2>
+        <a:srgbClr val="E8E8E8"/>
+      </a:lt2>
+      <a:accent1>
+        <a:srgbClr val="156082"/>
+      </a:accent1>
+      <a:accent2>
+        <a:srgbClr val="E97132"/>
+      </a:accent2>
+      <a:accent3>
+        <a:srgbClr val="196B24"/>
+      </a:accent3>
+      <a:accent4>
+        <a:srgbClr val="0F9ED5"/>
+      </a:accent4>
+      <a:accent5>
+        <a:srgbClr val="A02B93"/>
+      </a:accent5>
+      <a:accent6>
+        <a:srgbClr val="4EA72E"/>
+      </a:accent6>
+      <a:hlink>
+        <a:srgbClr val="467886"/>
+      </a:hlink>
+      <a:folHlink>
+        <a:srgbClr val="96607D"/>
+      </a:folHlink>
+    </a:clrScheme>
+    <a:fontScheme name="Office">
+      <a:majorFont>
+        <a:latin typeface="Aptos Display" panose="02110004020202020204"/>
+        <a:ea typeface=""/>
+        <a:cs typeface=""/>
+        <a:font script="Jpan" typeface="游ゴシック Light"/>
+        <a:font script="Hang" typeface="맑은 고딕"/>
+        <a:font script="Hans" typeface="等线 Light"/>
+        <a:font script="Hant" typeface="新細明體"/>
+        <a:font script="Arab" typeface="Times New Roman"/>
+        <a:font script="Hebr" typeface="Times New Roman"/>
+        <a:font script="Thai" typeface="Angsana New"/>
+        <a:font script="Ethi" typeface="Nyala"/>
+        <a:font script="Beng" typeface="Vrinda"/>
+        <a:font script="Gujr" typeface="Shruti"/>
+        <a:font script="Khmr" typeface="MoolBoran"/>
+        <a:font script="Knda" typeface="Tunga"/>
+        <a:font script="Guru" typeface="Raavi"/>
+        <a:font script="Cans" typeface="Euphemia"/>
+        <a:font script="Cher" typeface="Plantagenet Cherokee"/>
+        <a:font script="Yiii" typeface="Microsoft Yi Baiti"/>
+        <a:font script="Tibt" typeface="Microsoft Himalaya"/>
+        <a:font script="Thaa" typeface="MV Boli"/>
+        <a:font script="Deva" typeface="Mangal"/>
+        <a:font script="Telu" typeface="Gautami"/>
+        <a:font script="Taml" typeface="Latha"/>
+        <a:font script="Syrc" typeface="Estrangelo Edessa"/>
+        <a:font script="Orya" typeface="Kalinga"/>
+        <a:font script="Mlym" typeface="Kartika"/>
+        <a:font script="Laoo" typeface="DokChampa"/>
+        <a:font script="Sinh" typeface="Iskoola Pota"/>
+        <a:font script="Mong" typeface="Mongolian Baiti"/>
+        <a:font script="Viet" typeface="Times New Roman"/>
+        <a:font script="Uigh" typeface="Microsoft Uighur"/>
+        <a:font script="Geor" typeface="Sylfaen"/>
+        <a:font script="Armn" typeface="Arial"/>
+        <a:font script="Bugi" typeface="Leelawadee UI"/>
+        <a:font script="Bopo" typeface="Microsoft JhengHei"/>
+        <a:font script="Java" typeface="Javanese Text"/>
+        <a:font script="Lisu" typeface="Segoe UI"/>
+        <a:font script="Mymr" typeface="Myanmar Text"/>
+        <a:font script="Nkoo" typeface="Ebrima"/>
+        <a:font script="Olck" typeface="Nirmala UI"/>
+        <a:font script="Osma" typeface="Ebrima"/>
+        <a:font script="Phag" typeface="Phagspa"/>
+        <a:font script="Syrn" typeface="Estrangelo Edessa"/>
+        <a:font script="Syrj" typeface="Estrangelo Edessa"/>
+        <a:font script="Syre" typeface="Estrangelo Edessa"/>
+        <a:font script="Sora" typeface="Nirmala UI"/>
+        <a:font script="Tale" typeface="Microsoft Tai Le"/>
+        <a:font script="Talu" typeface="Microsoft New Tai Lue"/>
+        <a:font script="Tfng" typeface="Ebrima"/>
+      </a:majorFont>
+      <a:minorFont>
+        <a:latin typeface="Aptos" panose="02110004020202020204"/>
+        <a:ea typeface=""/>
+        <a:cs typeface=""/>
+        <a:font script="Jpan" typeface="游ゴシック"/>
+        <a:font script="Hang" typeface="맑은 고딕"/>
+        <a:font script="Hans" typeface="等线"/>
+        <a:font script="Hant" typeface="新細明體"/>
+        <a:font script="Arab" typeface="Arial"/>
+        <a:font script="Hebr" typeface="Arial"/>
+        <a:font script="Thai" typeface="Cordia New"/>
+        <a:font script="Ethi" typeface="Nyala"/>
+        <a:font script="Beng" typeface="Vrinda"/>
+        <a:font script="Gujr" typeface="Shruti"/>
+        <a:font script="Khmr" typeface="DaunPenh"/>
+        <a:font script="Knda" typeface="Tunga"/>
+        <a:font script="Guru" typeface="Raavi"/>
+        <a:font script="Cans" typeface="Euphemia"/>
+        <a:font script="Cher" typeface="Plantagenet Cherokee"/>
+        <a:font script="Yiii" typeface="Microsoft Yi Baiti"/>
+        <a:font script="Tibt" typeface="Microsoft Himalaya"/>
+        <a:font script="Thaa" typeface="MV Boli"/>
+        <a:font script="Deva" typeface="Mangal"/>
+        <a:font script="Telu" typeface="Gautami"/>
+        <a:font script="Taml" typeface="Latha"/>
+        <a:font script="Syrc" typeface="Estrangelo Edessa"/>
+        <a:font script="Orya" typeface="Kalinga"/>
+        <a:font script="Mlym" typeface="Kartika"/>
+        <a:font script="Laoo" typeface="DokChampa"/>
+        <a:font script="Sinh" typeface="Iskoola Pota"/>
+        <a:font script="Mong" typeface="Mongolian Baiti"/>
+        <a:font script="Viet" typeface="Arial"/>
+        <a:font script="Uigh" typeface="Microsoft Uighur"/>
+        <a:font script="Geor" typeface="Sylfaen"/>
+        <a:font script="Armn" typeface="Arial"/>
+        <a:font script="Bugi" typeface="Leelawadee UI"/>
+        <a:font script="Bopo" typeface="Microsoft JhengHei"/>
+        <a:font script="Java" typeface="Javanese Text"/>
+        <a:font script="Lisu" typeface="Segoe UI"/>
+        <a:font script="Mymr" typeface="Myanmar Text"/>
+        <a:font script="Nkoo" typeface="Ebrima"/>
+        <a:font script="Olck" typeface="Nirmala UI"/>
+        <a:font script="Osma" typeface="Ebrima"/>
+        <a:font script="Phag" typeface="Phagspa"/>
+        <a:font script="Syrn" typeface="Estrangelo Edessa"/>
+        <a:font script="Syrj" typeface="Estrangelo Edessa"/>
+        <a:font script="Syre" typeface="Estrangelo Edessa"/>
+        <a:font script="Sora" typeface="Nirmala UI"/>
+        <a:font script="Tale" typeface="Microsoft Tai Le"/>
+        <a:font script="Talu" typeface="Microsoft New Tai Lue"/>
+        <a:font script="Tfng" typeface="Ebrima"/>
+      </a:minorFont>
+    </a:fontScheme>
+    <a:fmtScheme name="Office">
+      <a:fillStyleLst>
+        <a:solidFill>
+          <a:schemeClr val="phClr"/>
+        </a:solidFill>
+        <a:gradFill rotWithShape="1">
+          <a:gsLst>
+            <a:gs pos="0">
+              <a:schemeClr val="phClr">
+                <a:lumMod val="110000"/>
+                <a:satMod val="105000"/>
+                <a:tint val="67000"/>
+              </a:schemeClr>
+            </a:gs>
+            <a:gs pos="50000">
+              <a:schemeClr val="phClr">
+                <a:lumMod val="105000"/>
+                <a:satMod val="103000"/>
+                <a:tint val="73000"/>
+              </a:schemeClr>
+            </a:gs>
+            <a:gs pos="100000">
+              <a:schemeClr val="phClr">
+                <a:lumMod val="105000"/>
+                <a:satMod val="109000"/>
+                <a:tint val="81000"/>
+              </a:schemeClr>
+            </a:gs>
+          </a:gsLst>
+          <a:lin ang="5400000" scaled="0"/>
+        </a:gradFill>
+        <a:gradFill rotWithShape="1">
+          <a:gsLst>
+            <a:gs pos="0">
+              <a:schemeClr val="phClr">
+                <a:satMod val="103000"/>
+                <a:lumMod val="102000"/>
+                <a:tint val="94000"/>
+              </a:schemeClr>
+            </a:gs>
+            <a:gs pos="50000">
+              <a:schemeClr val="phClr">
+                <a:satMod val="110000"/>
+                <a:lumMod val="100000"/>
+                <a:shade val="100000"/>
+              </a:schemeClr>
+            </a:gs>
+            <a:gs pos="100000">
+              <a:schemeClr val="phClr">
+                <a:lumMod val="99000"/>
+                <a:satMod val="120000"/>
+                <a:shade val="78000"/>
+              </a:schemeClr>
+            </a:gs>
+          </a:gsLst>
+          <a:lin ang="5400000" scaled="0"/>
+        </a:gradFill>
+      </a:fillStyleLst>
+      <a:lnStyleLst>
+        <a:ln w="12700" cap="flat" cmpd="sng" algn="ctr">
+          <a:solidFill>
+            <a:schemeClr val="phClr"/>
+          </a:solidFill>
+          <a:prstDash val="solid"/>
+          <a:miter lim="800000"/>
+        </a:ln>
+        <a:ln w="19050" cap="flat" cmpd="sng" algn="ctr">
+          <a:solidFill>
+            <a:schemeClr val="phClr"/>
+          </a:solidFill>
+          <a:prstDash val="solid"/>
+          <a:miter lim="800000"/>
+        </a:ln>
+        <a:ln w="25400" cap="flat" cmpd="sng" algn="ctr">
+          <a:solidFill>
+            <a:schemeClr val="phClr"/>
+          </a:solidFill>
+          <a:prstDash val="solid"/>
+          <a:miter lim="800000"/>
+        </a:ln>
+      </a:lnStyleLst>
+      <a:effectStyleLst>
+        <a:effectStyle>
+          <a:effectLst/>
+        </a:effectStyle>
+        <a:effectStyle>
+          <a:effectLst/>
+        </a:effectStyle>
+        <a:effectStyle>
+          <a:effectLst>
+            <a:outerShdw blurRad="57150" dist="19050" dir="5400000" algn="ctr" rotWithShape="0">
+              <a:srgbClr val="000000">
+                <a:alpha val="63000"/>
+              </a:srgbClr>
+            </a:outerShdw>
+          </a:effectLst>
+        </a:effectStyle>
+      </a:effectStyleLst>
+      <a:bgFillStyleLst>
+        <a:solidFill>
+          <a:schemeClr val="phClr"/>
+        </a:solidFill>
+        <a:solidFill>
+          <a:schemeClr val="phClr">
+            <a:tint val="95000"/>
+            <a:satMod val="170000"/>
+          </a:schemeClr>
+        </a:solidFill>
+        <a:gradFill rotWithShape="1">
+          <a:gsLst>
+            <a:gs pos="0">
+              <a:schemeClr val="phClr">
+                <a:tint val="93000"/>
+                <a:satMod val="150000"/>
+                <a:shade val="98000"/>
+                <a:lumMod val="102000"/>
+              </a:schemeClr>
+            </a:gs>
+            <a:gs pos="50000">
+              <a:schemeClr val="phClr">
+                <a:tint val="98000"/>
+                <a:satMod val="130000"/>
+                <a:shade val="90000"/>
+                <a:lumMod val="103000"/>
+              </a:schemeClr>
+            </a:gs>
+            <a:gs pos="100000">
+              <a:schemeClr val="phClr">
+                <a:shade val="63000"/>
+                <a:satMod val="120000"/>
+              </a:schemeClr>
+            </a:gs>
+          </a:gsLst>
+          <a:lin ang="5400000" scaled="0"/>
+        </a:gradFill>
+      </a:bgFillStyleLst>
+    </a:fmtScheme>
+  </a:themeElements>
+  <a:objectDefaults>
+    <a:lnDef>
+      <a:spPr/>
+      <a:bodyPr/>
+      <a:lstStyle/>
+      <a:style>
+        <a:lnRef idx="2">
+          <a:schemeClr val="accent1"/>
+        </a:lnRef>
+        <a:fillRef idx="0">
+          <a:schemeClr val="accent1"/>
+        </a:fillRef>
+        <a:effectRef idx="1">
+          <a:schemeClr val="accent1"/>
+        </a:effectRef>
+        <a:fontRef idx="minor">
+          <a:schemeClr val="tx1"/>
+        </a:fontRef>
+      </a:style>
+    </a:lnDef>
+  </a:objectDefaults>
+  <a:extraClrSchemeLst/>
+  <a:extLst>
+    <a:ext uri="{05A4C25C-085E-4340-85A3-A5531E510DB2}">
+      <thm15:themeFamily xmlns:thm15="http://schemas.microsoft.com/office/thememl/2012/main" name="Office Theme" id="{2E142A2C-CD16-42D6-873A-C26D2A0506FA}" vid="{1BDDFF52-6CD6-40A5-AB3C-68EB2F1E4D0A}"/>
+    </a:ext>
+  </a:extLst>
+</a:theme>
 </file>
</xml_diff>

<commit_message>
Aggiunte ai confronti finali
</commit_message>
<xml_diff>
--- a/Ppt/Optimization.pptx
+++ b/Ppt/Optimization.pptx
@@ -5,7 +5,7 @@
     <p:sldMasterId id="2147483648" r:id="rId1"/>
   </p:sldMasterIdLst>
   <p:notesMasterIdLst>
-    <p:notesMasterId r:id="rId52"/>
+    <p:notesMasterId r:id="rId53"/>
   </p:notesMasterIdLst>
   <p:sldIdLst>
     <p:sldId id="256" r:id="rId2"/>
@@ -58,6 +58,7 @@
     <p:sldId id="312" r:id="rId49"/>
     <p:sldId id="313" r:id="rId50"/>
     <p:sldId id="314" r:id="rId51"/>
+    <p:sldId id="315" r:id="rId52"/>
   </p:sldIdLst>
   <p:sldSz cx="12192000" cy="6858000"/>
   <p:notesSz cx="12192000" cy="6858000"/>
@@ -167,7 +168,7 @@
           <a:p>
             <a:fld id="{52CF3C78-BFF9-4137-8833-13E3D0B09D8B}" type="datetimeFigureOut">
               <a:rPr lang="it-IT" smtClean="0"/>
-              <a:t>14/06/2025</a:t>
+              <a:t>15/06/2025</a:t>
             </a:fld>
             <a:endParaRPr lang="it-IT"/>
           </a:p>
@@ -669,7 +670,7 @@
           <a:p>
             <a:fld id="{1D8BD707-D9CF-40AE-B4C6-C98DA3205C09}" type="datetimeFigureOut">
               <a:rPr lang="en-US"/>
-              <a:t>6/14/2025</a:t>
+              <a:t>6/15/2025</a:t>
             </a:fld>
             <a:endParaRPr lang="en-US"/>
           </a:p>
@@ -846,7 +847,7 @@
           <a:p>
             <a:fld id="{1D8BD707-D9CF-40AE-B4C6-C98DA3205C09}" type="datetimeFigureOut">
               <a:rPr lang="en-US"/>
-              <a:t>6/14/2025</a:t>
+              <a:t>6/15/2025</a:t>
             </a:fld>
             <a:endParaRPr lang="en-US"/>
           </a:p>
@@ -1060,7 +1061,7 @@
           <a:p>
             <a:fld id="{1D8BD707-D9CF-40AE-B4C6-C98DA3205C09}" type="datetimeFigureOut">
               <a:rPr lang="en-US"/>
-              <a:t>6/14/2025</a:t>
+              <a:t>6/15/2025</a:t>
             </a:fld>
             <a:endParaRPr lang="en-US"/>
           </a:p>
@@ -1208,7 +1209,7 @@
           <a:p>
             <a:fld id="{1D8BD707-D9CF-40AE-B4C6-C98DA3205C09}" type="datetimeFigureOut">
               <a:rPr lang="en-US"/>
-              <a:t>6/14/2025</a:t>
+              <a:t>6/15/2025</a:t>
             </a:fld>
             <a:endParaRPr lang="en-US"/>
           </a:p>
@@ -1327,7 +1328,7 @@
           <a:p>
             <a:fld id="{1D8BD707-D9CF-40AE-B4C6-C98DA3205C09}" type="datetimeFigureOut">
               <a:rPr lang="en-US"/>
-              <a:t>6/14/2025</a:t>
+              <a:t>6/15/2025</a:t>
             </a:fld>
             <a:endParaRPr lang="en-US"/>
           </a:p>
@@ -1624,7 +1625,7 @@
           <a:p>
             <a:fld id="{1D8BD707-D9CF-40AE-B4C6-C98DA3205C09}" type="datetimeFigureOut">
               <a:rPr lang="en-US"/>
-              <a:t>6/14/2025</a:t>
+              <a:t>6/15/2025</a:t>
             </a:fld>
             <a:endParaRPr lang="en-US"/>
           </a:p>
@@ -5707,8 +5708,8 @@
           </a:p>
         </p:txBody>
       </p:sp>
-      <mc:AlternateContent xmlns:mc="http://schemas.openxmlformats.org/markup-compatibility/2006" xmlns:a14="http://schemas.microsoft.com/office/drawing/2010/main">
-        <mc:Choice Requires="a14">
+      <mc:AlternateContent xmlns:mc="http://schemas.openxmlformats.org/markup-compatibility/2006">
+        <mc:Choice xmlns:a14="http://schemas.microsoft.com/office/drawing/2010/main" Requires="a14">
           <p:sp>
             <p:nvSpPr>
               <p:cNvPr id="4" name="CasellaDiTesto 3">
@@ -5752,7 +5753,7 @@
                     <a:latin typeface="Arial" panose="020B0604020202020204" pitchFamily="34" charset="0"/>
                     <a:cs typeface="Arial" panose="020B0604020202020204" pitchFamily="34" charset="0"/>
                   </a:rPr>
-                  <a:t>empirical</a:t>
+                  <a:t>empirically</a:t>
                 </a:r>
                 <a:r>
                   <a:rPr lang="en-GB" sz="2800" noProof="0" dirty="0">
@@ -5843,7 +5844,7 @@
             </p:txBody>
           </p:sp>
         </mc:Choice>
-        <mc:Fallback xmlns="">
+        <mc:Fallback>
           <p:sp>
             <p:nvSpPr>
               <p:cNvPr id="4" name="CasellaDiTesto 3">
@@ -5869,7 +5870,7 @@
               <a:blipFill>
                 <a:blip r:embed="rId2"/>
                 <a:stretch>
-                  <a:fillRect l="-1159" t="-12791" b="-31395"/>
+                  <a:fillRect l="-1159" t="-12791" r="-522" b="-31395"/>
                 </a:stretch>
               </a:blipFill>
             </p:spPr>
@@ -10239,8 +10240,8 @@
           </a:p>
         </p:txBody>
       </p:sp>
-      <mc:AlternateContent xmlns:mc="http://schemas.openxmlformats.org/markup-compatibility/2006" xmlns:a14="http://schemas.microsoft.com/office/drawing/2010/main">
-        <mc:Choice Requires="a14">
+      <mc:AlternateContent xmlns:mc="http://schemas.openxmlformats.org/markup-compatibility/2006">
+        <mc:Choice xmlns:a14="http://schemas.microsoft.com/office/drawing/2010/main" Requires="a14">
           <p:sp>
             <p:nvSpPr>
               <p:cNvPr id="8" name="CasellaDiTesto 7">
@@ -10287,7 +10288,7 @@
                 <a14:m>
                   <m:oMathPara xmlns:m="http://schemas.openxmlformats.org/officeDocument/2006/math">
                     <m:oMathParaPr>
-                      <m:jc m:val="centerGroup"/>
+                      <m:jc m:val="left"/>
                     </m:oMathParaPr>
                     <m:oMath xmlns:m="http://schemas.openxmlformats.org/officeDocument/2006/math">
                       <m:d>
@@ -10488,7 +10489,7 @@
             </p:txBody>
           </p:sp>
         </mc:Choice>
-        <mc:Fallback xmlns="">
+        <mc:Fallback>
           <p:sp>
             <p:nvSpPr>
               <p:cNvPr id="8" name="CasellaDiTesto 7">
@@ -13262,19 +13263,13 @@
               <a:rPr lang="en-GB" dirty="0">
                 <a:latin typeface="Arial Black" panose="020B0A04020102020204" pitchFamily="34" charset="0"/>
               </a:rPr>
-              <a:t>Random c</a:t>
-            </a:r>
-            <a:r>
-              <a:rPr lang="en-GB" noProof="0" dirty="0" err="1">
-                <a:latin typeface="Arial Black" panose="020B0A04020102020204" pitchFamily="34" charset="0"/>
-              </a:rPr>
-              <a:t>oordinate</a:t>
+              <a:t>Random coordinate </a:t>
             </a:r>
             <a:r>
               <a:rPr lang="en-GB" noProof="0" dirty="0">
                 <a:latin typeface="Arial Black" panose="020B0A04020102020204" pitchFamily="34" charset="0"/>
               </a:rPr>
-              <a:t> descent</a:t>
+              <a:t>descent</a:t>
             </a:r>
           </a:p>
         </p:txBody>
@@ -14349,7 +14344,7 @@
           <a:p>
             <a:r>
               <a:rPr lang="en-US" sz="2800" dirty="0"/>
-              <a:t>All three converge in less than 40 steps.</a:t>
+              <a:t>All three converge in less than 50 steps.</a:t>
             </a:r>
           </a:p>
           <a:p>
@@ -16101,7 +16096,13 @@
           <p:cNvGraphicFramePr>
             <a:graphicFrameLocks noGrp="1"/>
           </p:cNvGraphicFramePr>
-          <p:nvPr/>
+          <p:nvPr>
+            <p:extLst>
+              <p:ext uri="{D42A27DB-BD31-4B8C-83A1-F6EECF244321}">
+                <p14:modId xmlns:p14="http://schemas.microsoft.com/office/powerpoint/2010/main" val="1630033602"/>
+              </p:ext>
+            </p:extLst>
+          </p:nvPr>
         </p:nvGraphicFramePr>
         <p:xfrm>
           <a:off x="2286000" y="1143000"/>
@@ -16246,7 +16247,7 @@
                           <a:ea typeface="+mn-ea"/>
                           <a:cs typeface="Arial" panose="020B0604020202020204" pitchFamily="34" charset="0"/>
                         </a:rPr>
-                        <a:t>Step </a:t>
+                        <a:t>Steps </a:t>
                       </a:r>
                       <a:r>
                         <a:rPr lang="it-IT" b="1" dirty="0" err="1">
@@ -16283,7 +16284,7 @@
                     <a:bodyPr/>
                     <a:lstStyle/>
                     <a:p>
-                      <a:pPr marL="0" algn="r"/>
+                      <a:pPr marL="0" algn="ctr"/>
                       <a:r>
                         <a:rPr lang="en-US" b="0" i="1" u="none" dirty="0">
                           <a:solidFill>
@@ -16361,7 +16362,7 @@
                     <a:bodyPr/>
                     <a:lstStyle/>
                     <a:p>
-                      <a:pPr marL="0" algn="r"/>
+                      <a:pPr marL="0" algn="ctr"/>
                       <a:r>
                         <a:rPr lang="it-IT" b="0" i="1" u="none" dirty="0" err="1">
                           <a:solidFill>
@@ -16442,7 +16443,7 @@
                     <a:bodyPr/>
                     <a:lstStyle/>
                     <a:p>
-                      <a:pPr marL="0" algn="r"/>
+                      <a:pPr marL="0" algn="ctr"/>
                       <a:r>
                         <a:rPr lang="it-IT" b="0" i="1" u="none" dirty="0" err="1">
                           <a:solidFill>
@@ -16542,7 +16543,7 @@
                     <a:bodyPr/>
                     <a:lstStyle/>
                     <a:p>
-                      <a:pPr marL="0" algn="r"/>
+                      <a:pPr marL="0" algn="ctr"/>
                       <a:r>
                         <a:rPr lang="it-IT" b="0" i="1" u="none" dirty="0">
                           <a:solidFill>
@@ -16634,7 +16635,62 @@
                     <a:bodyPr/>
                     <a:lstStyle/>
                     <a:p>
-                      <a:pPr marL="0" algn="r"/>
+                      <a:pPr marL="0" algn="ctr"/>
+                      <a:r>
+                        <a:rPr lang="it-IT" b="0" i="1" u="none" dirty="0" err="1">
+                          <a:solidFill>
+                            <a:schemeClr val="tx1"/>
+                          </a:solidFill>
+                          <a:latin typeface="Arial" panose="020B0604020202020204" pitchFamily="34" charset="0"/>
+                          <a:ea typeface="+mn-ea"/>
+                          <a:cs typeface="Arial" panose="020B0604020202020204" pitchFamily="34" charset="0"/>
+                        </a:rPr>
+                        <a:t>Minibatch</a:t>
+                      </a:r>
+                      <a:r>
+                        <a:rPr lang="it-IT" b="0" i="1" u="none" dirty="0">
+                          <a:solidFill>
+                            <a:schemeClr val="tx1"/>
+                          </a:solidFill>
+                          <a:latin typeface="Arial" panose="020B0604020202020204" pitchFamily="34" charset="0"/>
+                          <a:ea typeface="+mn-ea"/>
+                          <a:cs typeface="Arial" panose="020B0604020202020204" pitchFamily="34" charset="0"/>
+                        </a:rPr>
+                        <a:t> </a:t>
+                      </a:r>
+                      <a:r>
+                        <a:rPr lang="it-IT" b="0" i="1" u="none" dirty="0" err="1">
+                          <a:solidFill>
+                            <a:schemeClr val="tx1"/>
+                          </a:solidFill>
+                          <a:latin typeface="Arial" panose="020B0604020202020204" pitchFamily="34" charset="0"/>
+                          <a:ea typeface="+mn-ea"/>
+                          <a:cs typeface="Arial" panose="020B0604020202020204" pitchFamily="34" charset="0"/>
+                        </a:rPr>
+                        <a:t>Stochastic</a:t>
+                      </a:r>
+                      <a:r>
+                        <a:rPr lang="it-IT" b="0" i="1" u="none" dirty="0">
+                          <a:solidFill>
+                            <a:schemeClr val="tx1"/>
+                          </a:solidFill>
+                          <a:latin typeface="Arial" panose="020B0604020202020204" pitchFamily="34" charset="0"/>
+                          <a:ea typeface="+mn-ea"/>
+                          <a:cs typeface="Arial" panose="020B0604020202020204" pitchFamily="34" charset="0"/>
+                        </a:rPr>
+                        <a:t> </a:t>
+                      </a:r>
+                      <a:r>
+                        <a:rPr lang="it-IT" b="0" i="1" u="none" dirty="0" err="1">
+                          <a:solidFill>
+                            <a:schemeClr val="tx1"/>
+                          </a:solidFill>
+                          <a:latin typeface="Arial" panose="020B0604020202020204" pitchFamily="34" charset="0"/>
+                          <a:ea typeface="+mn-ea"/>
+                          <a:cs typeface="Arial" panose="020B0604020202020204" pitchFamily="34" charset="0"/>
+                        </a:rPr>
+                        <a:t>Gradient</a:t>
+                      </a:r>
                       <a:endParaRPr lang="it-IT" b="0" i="1" u="none" dirty="0">
                         <a:solidFill>
                           <a:schemeClr val="tx1"/>
@@ -16653,14 +16709,17 @@
                     <a:lstStyle/>
                     <a:p>
                       <a:pPr marL="0" algn="ctr"/>
-                      <a:endParaRPr lang="it-IT" b="0" dirty="0">
-                        <a:solidFill>
-                          <a:schemeClr val="tx1"/>
-                        </a:solidFill>
-                        <a:latin typeface="Arial" panose="020B0604020202020204" pitchFamily="34" charset="0"/>
-                        <a:ea typeface="+mn-ea"/>
-                        <a:cs typeface="Arial" panose="020B0604020202020204" pitchFamily="34" charset="0"/>
-                      </a:endParaRPr>
+                      <a:r>
+                        <a:rPr lang="it-IT" b="0" dirty="0">
+                          <a:solidFill>
+                            <a:schemeClr val="tx1"/>
+                          </a:solidFill>
+                          <a:latin typeface="Arial" panose="020B0604020202020204" pitchFamily="34" charset="0"/>
+                          <a:ea typeface="+mn-ea"/>
+                          <a:cs typeface="Arial" panose="020B0604020202020204" pitchFamily="34" charset="0"/>
+                        </a:rPr>
+                        <a:t>203ms</a:t>
+                      </a:r>
                     </a:p>
                   </a:txBody>
                   <a:tcPr/>
@@ -16671,14 +16730,17 @@
                     <a:lstStyle/>
                     <a:p>
                       <a:pPr marL="0" algn="ctr"/>
-                      <a:endParaRPr lang="it-IT" b="0" dirty="0">
-                        <a:solidFill>
-                          <a:schemeClr val="tx1"/>
-                        </a:solidFill>
-                        <a:latin typeface="Arial" panose="020B0604020202020204" pitchFamily="34" charset="0"/>
-                        <a:ea typeface="+mn-ea"/>
-                        <a:cs typeface="Arial" panose="020B0604020202020204" pitchFamily="34" charset="0"/>
-                      </a:endParaRPr>
+                      <a:r>
+                        <a:rPr lang="it-IT" b="0" dirty="0">
+                          <a:solidFill>
+                            <a:schemeClr val="tx1"/>
+                          </a:solidFill>
+                          <a:latin typeface="Arial" panose="020B0604020202020204" pitchFamily="34" charset="0"/>
+                          <a:ea typeface="+mn-ea"/>
+                          <a:cs typeface="Arial" panose="020B0604020202020204" pitchFamily="34" charset="0"/>
+                        </a:rPr>
+                        <a:t>/</a:t>
+                      </a:r>
                     </a:p>
                   </a:txBody>
                   <a:tcPr/>
@@ -16695,7 +16757,191 @@
                     <a:bodyPr/>
                     <a:lstStyle/>
                     <a:p>
-                      <a:pPr marL="0" algn="r"/>
+                      <a:pPr marL="0" algn="ctr"/>
+                      <a:r>
+                        <a:rPr lang="it-IT" b="0" i="1" u="none" dirty="0">
+                          <a:solidFill>
+                            <a:schemeClr val="tx1"/>
+                          </a:solidFill>
+                          <a:latin typeface="Arial" panose="020B0604020202020204" pitchFamily="34" charset="0"/>
+                          <a:ea typeface="+mn-ea"/>
+                          <a:cs typeface="Arial" panose="020B0604020202020204" pitchFamily="34" charset="0"/>
+                        </a:rPr>
+                        <a:t>ADAGRAD</a:t>
+                      </a:r>
+                    </a:p>
+                  </a:txBody>
+                  <a:tcPr/>
+                </a:tc>
+                <a:tc>
+                  <a:txBody>
+                    <a:bodyPr/>
+                    <a:lstStyle/>
+                    <a:p>
+                      <a:pPr marL="0" algn="ctr"/>
+                      <a:r>
+                        <a:rPr lang="it-IT" b="0" dirty="0">
+                          <a:solidFill>
+                            <a:schemeClr val="tx1"/>
+                          </a:solidFill>
+                          <a:latin typeface="Arial" panose="020B0604020202020204" pitchFamily="34" charset="0"/>
+                          <a:ea typeface="+mn-ea"/>
+                          <a:cs typeface="Arial" panose="020B0604020202020204" pitchFamily="34" charset="0"/>
+                        </a:rPr>
+                        <a:t>215ms</a:t>
+                      </a:r>
+                    </a:p>
+                  </a:txBody>
+                  <a:tcPr/>
+                </a:tc>
+                <a:tc>
+                  <a:txBody>
+                    <a:bodyPr/>
+                    <a:lstStyle/>
+                    <a:p>
+                      <a:pPr marL="0" algn="ctr"/>
+                      <a:r>
+                        <a:rPr lang="it-IT" b="0" dirty="0">
+                          <a:solidFill>
+                            <a:schemeClr val="tx1"/>
+                          </a:solidFill>
+                          <a:latin typeface="Arial" panose="020B0604020202020204" pitchFamily="34" charset="0"/>
+                          <a:ea typeface="+mn-ea"/>
+                          <a:cs typeface="Arial" panose="020B0604020202020204" pitchFamily="34" charset="0"/>
+                        </a:rPr>
+                        <a:t>/</a:t>
+                      </a:r>
+                    </a:p>
+                  </a:txBody>
+                  <a:tcPr/>
+                </a:tc>
+                <a:extLst>
+                  <a:ext uri="{0D108BD9-81ED-4DB2-BD59-A6C34878D82A}">
+                    <a16:rowId xmlns:a16="http://schemas.microsoft.com/office/drawing/2014/main" val="2060404606"/>
+                  </a:ext>
+                </a:extLst>
+              </a:tr>
+              <a:tr h="470307">
+                <a:tc>
+                  <a:txBody>
+                    <a:bodyPr/>
+                    <a:lstStyle/>
+                    <a:p>
+                      <a:pPr marL="0" algn="ctr"/>
+                      <a:r>
+                        <a:rPr lang="it-IT" b="0" i="1" u="none" dirty="0">
+                          <a:solidFill>
+                            <a:schemeClr val="tx1"/>
+                          </a:solidFill>
+                          <a:latin typeface="Arial" panose="020B0604020202020204" pitchFamily="34" charset="0"/>
+                          <a:ea typeface="+mn-ea"/>
+                          <a:cs typeface="Arial" panose="020B0604020202020204" pitchFamily="34" charset="0"/>
+                        </a:rPr>
+                        <a:t>ADAM</a:t>
+                      </a:r>
+                    </a:p>
+                  </a:txBody>
+                  <a:tcPr/>
+                </a:tc>
+                <a:tc>
+                  <a:txBody>
+                    <a:bodyPr/>
+                    <a:lstStyle/>
+                    <a:p>
+                      <a:pPr marL="0" algn="ctr"/>
+                      <a:r>
+                        <a:rPr lang="it-IT" b="0" dirty="0">
+                          <a:solidFill>
+                            <a:schemeClr val="tx1"/>
+                          </a:solidFill>
+                          <a:latin typeface="Arial" panose="020B0604020202020204" pitchFamily="34" charset="0"/>
+                          <a:ea typeface="+mn-ea"/>
+                          <a:cs typeface="Arial" panose="020B0604020202020204" pitchFamily="34" charset="0"/>
+                        </a:rPr>
+                        <a:t>245ms</a:t>
+                      </a:r>
+                    </a:p>
+                  </a:txBody>
+                  <a:tcPr/>
+                </a:tc>
+                <a:tc>
+                  <a:txBody>
+                    <a:bodyPr/>
+                    <a:lstStyle/>
+                    <a:p>
+                      <a:pPr marL="0" algn="ctr"/>
+                      <a:r>
+                        <a:rPr lang="it-IT" b="0" dirty="0">
+                          <a:solidFill>
+                            <a:schemeClr val="tx1"/>
+                          </a:solidFill>
+                          <a:latin typeface="Arial" panose="020B0604020202020204" pitchFamily="34" charset="0"/>
+                          <a:ea typeface="+mn-ea"/>
+                          <a:cs typeface="Arial" panose="020B0604020202020204" pitchFamily="34" charset="0"/>
+                        </a:rPr>
+                        <a:t>/</a:t>
+                      </a:r>
+                    </a:p>
+                  </a:txBody>
+                  <a:tcPr/>
+                </a:tc>
+                <a:extLst>
+                  <a:ext uri="{0D108BD9-81ED-4DB2-BD59-A6C34878D82A}">
+                    <a16:rowId xmlns:a16="http://schemas.microsoft.com/office/drawing/2014/main" val="4239845344"/>
+                  </a:ext>
+                </a:extLst>
+              </a:tr>
+              <a:tr h="470307">
+                <a:tc>
+                  <a:txBody>
+                    <a:bodyPr/>
+                    <a:lstStyle/>
+                    <a:p>
+                      <a:pPr marL="0" algn="ctr"/>
+                      <a:r>
+                        <a:rPr lang="it-IT" b="0" i="1" u="none" dirty="0">
+                          <a:solidFill>
+                            <a:schemeClr val="tx1"/>
+                          </a:solidFill>
+                          <a:latin typeface="Arial" panose="020B0604020202020204" pitchFamily="34" charset="0"/>
+                          <a:ea typeface="+mn-ea"/>
+                          <a:cs typeface="Arial" panose="020B0604020202020204" pitchFamily="34" charset="0"/>
+                        </a:rPr>
+                        <a:t>Sign </a:t>
+                      </a:r>
+                      <a:r>
+                        <a:rPr lang="it-IT" b="0" i="1" u="none" dirty="0" err="1">
+                          <a:solidFill>
+                            <a:schemeClr val="tx1"/>
+                          </a:solidFill>
+                          <a:latin typeface="Arial" panose="020B0604020202020204" pitchFamily="34" charset="0"/>
+                          <a:ea typeface="+mn-ea"/>
+                          <a:cs typeface="Arial" panose="020B0604020202020204" pitchFamily="34" charset="0"/>
+                        </a:rPr>
+                        <a:t>Stochastic</a:t>
+                      </a:r>
+                      <a:r>
+                        <a:rPr lang="it-IT" b="0" i="1" u="none" dirty="0">
+                          <a:solidFill>
+                            <a:schemeClr val="tx1"/>
+                          </a:solidFill>
+                          <a:latin typeface="Arial" panose="020B0604020202020204" pitchFamily="34" charset="0"/>
+                          <a:ea typeface="+mn-ea"/>
+                          <a:cs typeface="Arial" panose="020B0604020202020204" pitchFamily="34" charset="0"/>
+                        </a:rPr>
+                        <a:t> </a:t>
+                      </a:r>
+                      <a:r>
+                        <a:rPr lang="it-IT" b="0" i="1" u="none" dirty="0" err="1">
+                          <a:solidFill>
+                            <a:schemeClr val="tx1"/>
+                          </a:solidFill>
+                          <a:latin typeface="Arial" panose="020B0604020202020204" pitchFamily="34" charset="0"/>
+                          <a:ea typeface="+mn-ea"/>
+                          <a:cs typeface="Arial" panose="020B0604020202020204" pitchFamily="34" charset="0"/>
+                        </a:rPr>
+                        <a:t>gradient</a:t>
+                      </a:r>
                       <a:endParaRPr lang="it-IT" b="0" i="1" u="none" dirty="0">
                         <a:solidFill>
                           <a:schemeClr val="tx1"/>
@@ -16714,14 +16960,17 @@
                     <a:lstStyle/>
                     <a:p>
                       <a:pPr marL="0" algn="ctr"/>
-                      <a:endParaRPr lang="it-IT" b="0" dirty="0">
-                        <a:solidFill>
-                          <a:schemeClr val="tx1"/>
-                        </a:solidFill>
-                        <a:latin typeface="Arial" panose="020B0604020202020204" pitchFamily="34" charset="0"/>
-                        <a:ea typeface="+mn-ea"/>
-                        <a:cs typeface="Arial" panose="020B0604020202020204" pitchFamily="34" charset="0"/>
-                      </a:endParaRPr>
+                      <a:r>
+                        <a:rPr lang="it-IT" b="0" dirty="0">
+                          <a:solidFill>
+                            <a:schemeClr val="tx1"/>
+                          </a:solidFill>
+                          <a:latin typeface="Arial" panose="020B0604020202020204" pitchFamily="34" charset="0"/>
+                          <a:ea typeface="+mn-ea"/>
+                          <a:cs typeface="Arial" panose="020B0604020202020204" pitchFamily="34" charset="0"/>
+                        </a:rPr>
+                        <a:t>180ms</a:t>
+                      </a:r>
                     </a:p>
                   </a:txBody>
                   <a:tcPr/>
@@ -16732,136 +16981,17 @@
                     <a:lstStyle/>
                     <a:p>
                       <a:pPr marL="0" algn="ctr"/>
-                      <a:endParaRPr lang="it-IT" b="0" dirty="0">
-                        <a:solidFill>
-                          <a:schemeClr val="tx1"/>
-                        </a:solidFill>
-                        <a:latin typeface="Arial" panose="020B0604020202020204" pitchFamily="34" charset="0"/>
-                        <a:ea typeface="+mn-ea"/>
-                        <a:cs typeface="Arial" panose="020B0604020202020204" pitchFamily="34" charset="0"/>
-                      </a:endParaRPr>
-                    </a:p>
-                  </a:txBody>
-                  <a:tcPr/>
-                </a:tc>
-                <a:extLst>
-                  <a:ext uri="{0D108BD9-81ED-4DB2-BD59-A6C34878D82A}">
-                    <a16:rowId xmlns:a16="http://schemas.microsoft.com/office/drawing/2014/main" val="2060404606"/>
-                  </a:ext>
-                </a:extLst>
-              </a:tr>
-              <a:tr h="470307">
-                <a:tc>
-                  <a:txBody>
-                    <a:bodyPr/>
-                    <a:lstStyle/>
-                    <a:p>
-                      <a:pPr marL="0" algn="r"/>
-                      <a:endParaRPr lang="it-IT" b="0" i="1" u="none" dirty="0">
-                        <a:solidFill>
-                          <a:schemeClr val="tx1"/>
-                        </a:solidFill>
-                        <a:latin typeface="Arial" panose="020B0604020202020204" pitchFamily="34" charset="0"/>
-                        <a:ea typeface="+mn-ea"/>
-                        <a:cs typeface="Arial" panose="020B0604020202020204" pitchFamily="34" charset="0"/>
-                      </a:endParaRPr>
-                    </a:p>
-                  </a:txBody>
-                  <a:tcPr/>
-                </a:tc>
-                <a:tc>
-                  <a:txBody>
-                    <a:bodyPr/>
-                    <a:lstStyle/>
-                    <a:p>
-                      <a:pPr marL="0" algn="ctr"/>
-                      <a:endParaRPr lang="it-IT" b="0" dirty="0">
-                        <a:solidFill>
-                          <a:schemeClr val="tx1"/>
-                        </a:solidFill>
-                        <a:latin typeface="Arial" panose="020B0604020202020204" pitchFamily="34" charset="0"/>
-                        <a:ea typeface="+mn-ea"/>
-                        <a:cs typeface="Arial" panose="020B0604020202020204" pitchFamily="34" charset="0"/>
-                      </a:endParaRPr>
-                    </a:p>
-                  </a:txBody>
-                  <a:tcPr/>
-                </a:tc>
-                <a:tc>
-                  <a:txBody>
-                    <a:bodyPr/>
-                    <a:lstStyle/>
-                    <a:p>
-                      <a:pPr marL="0" algn="ctr"/>
-                      <a:endParaRPr lang="it-IT" b="0" dirty="0">
-                        <a:solidFill>
-                          <a:schemeClr val="tx1"/>
-                        </a:solidFill>
-                        <a:latin typeface="Arial" panose="020B0604020202020204" pitchFamily="34" charset="0"/>
-                        <a:ea typeface="+mn-ea"/>
-                        <a:cs typeface="Arial" panose="020B0604020202020204" pitchFamily="34" charset="0"/>
-                      </a:endParaRPr>
-                    </a:p>
-                  </a:txBody>
-                  <a:tcPr/>
-                </a:tc>
-                <a:extLst>
-                  <a:ext uri="{0D108BD9-81ED-4DB2-BD59-A6C34878D82A}">
-                    <a16:rowId xmlns:a16="http://schemas.microsoft.com/office/drawing/2014/main" val="4239845344"/>
-                  </a:ext>
-                </a:extLst>
-              </a:tr>
-              <a:tr h="470307">
-                <a:tc>
-                  <a:txBody>
-                    <a:bodyPr/>
-                    <a:lstStyle/>
-                    <a:p>
-                      <a:pPr marL="0" algn="r"/>
-                      <a:endParaRPr lang="it-IT" b="0" i="1" u="none" dirty="0">
-                        <a:solidFill>
-                          <a:schemeClr val="tx1"/>
-                        </a:solidFill>
-                        <a:latin typeface="Arial" panose="020B0604020202020204" pitchFamily="34" charset="0"/>
-                        <a:ea typeface="+mn-ea"/>
-                        <a:cs typeface="Arial" panose="020B0604020202020204" pitchFamily="34" charset="0"/>
-                      </a:endParaRPr>
-                    </a:p>
-                  </a:txBody>
-                  <a:tcPr/>
-                </a:tc>
-                <a:tc>
-                  <a:txBody>
-                    <a:bodyPr/>
-                    <a:lstStyle/>
-                    <a:p>
-                      <a:pPr marL="0" algn="ctr"/>
-                      <a:endParaRPr lang="it-IT" b="0" dirty="0">
-                        <a:solidFill>
-                          <a:schemeClr val="tx1"/>
-                        </a:solidFill>
-                        <a:latin typeface="Arial" panose="020B0604020202020204" pitchFamily="34" charset="0"/>
-                        <a:ea typeface="+mn-ea"/>
-                        <a:cs typeface="Arial" panose="020B0604020202020204" pitchFamily="34" charset="0"/>
-                      </a:endParaRPr>
-                    </a:p>
-                  </a:txBody>
-                  <a:tcPr/>
-                </a:tc>
-                <a:tc>
-                  <a:txBody>
-                    <a:bodyPr/>
-                    <a:lstStyle/>
-                    <a:p>
-                      <a:pPr marL="0" algn="ctr"/>
-                      <a:endParaRPr lang="it-IT" b="0" dirty="0">
-                        <a:solidFill>
-                          <a:schemeClr val="tx1"/>
-                        </a:solidFill>
-                        <a:latin typeface="Arial" panose="020B0604020202020204" pitchFamily="34" charset="0"/>
-                        <a:ea typeface="+mn-ea"/>
-                        <a:cs typeface="Arial" panose="020B0604020202020204" pitchFamily="34" charset="0"/>
-                      </a:endParaRPr>
+                      <a:r>
+                        <a:rPr lang="it-IT" b="0" dirty="0">
+                          <a:solidFill>
+                            <a:schemeClr val="tx1"/>
+                          </a:solidFill>
+                          <a:latin typeface="Arial" panose="020B0604020202020204" pitchFamily="34" charset="0"/>
+                          <a:ea typeface="+mn-ea"/>
+                          <a:cs typeface="Arial" panose="020B0604020202020204" pitchFamily="34" charset="0"/>
+                        </a:rPr>
+                        <a:t>/</a:t>
+                      </a:r>
                     </a:p>
                   </a:txBody>
                   <a:tcPr/>
@@ -16878,7 +17008,7 @@
                     <a:bodyPr/>
                     <a:lstStyle/>
                     <a:p>
-                      <a:pPr marL="0" algn="r"/>
+                      <a:pPr marL="0" algn="ctr"/>
                       <a:r>
                         <a:rPr lang="it-IT" b="0" i="1" u="none" dirty="0">
                           <a:solidFill>
@@ -16950,6 +17080,507 @@
     <p:extLst>
       <p:ext uri="{BB962C8B-B14F-4D97-AF65-F5344CB8AC3E}">
         <p14:creationId xmlns:p14="http://schemas.microsoft.com/office/powerpoint/2010/main" val="250821435"/>
+      </p:ext>
+    </p:extLst>
+  </p:cSld>
+  <p:clrMapOvr>
+    <a:masterClrMapping/>
+  </p:clrMapOvr>
+</p:sld>
+</file>
+
+<file path=ppt/slides/slide51.xml><?xml version="1.0" encoding="utf-8"?>
+<p:sld xmlns:a="http://schemas.openxmlformats.org/drawingml/2006/main" xmlns:r="http://schemas.openxmlformats.org/officeDocument/2006/relationships" xmlns:p="http://schemas.openxmlformats.org/presentationml/2006/main">
+  <p:cSld>
+    <p:spTree>
+      <p:nvGrpSpPr>
+        <p:cNvPr id="1" name="">
+          <a:extLst>
+            <a:ext uri="{FF2B5EF4-FFF2-40B4-BE49-F238E27FC236}">
+              <a16:creationId xmlns:a16="http://schemas.microsoft.com/office/drawing/2014/main" id="{B682C048-A946-ADD7-597E-6DAB6DF77F84}"/>
+            </a:ext>
+          </a:extLst>
+        </p:cNvPr>
+        <p:cNvGrpSpPr/>
+        <p:nvPr/>
+      </p:nvGrpSpPr>
+      <p:grpSpPr>
+        <a:xfrm>
+          <a:off x="0" y="0"/>
+          <a:ext cx="0" cy="0"/>
+          <a:chOff x="0" y="0"/>
+          <a:chExt cx="0" cy="0"/>
+        </a:xfrm>
+      </p:grpSpPr>
+      <p:sp>
+        <p:nvSpPr>
+          <p:cNvPr id="10" name="Titolo 9">
+            <a:extLst>
+              <a:ext uri="{FF2B5EF4-FFF2-40B4-BE49-F238E27FC236}">
+                <a16:creationId xmlns:a16="http://schemas.microsoft.com/office/drawing/2014/main" id="{22878303-8A4F-ED39-31CB-0D8138E4A3F8}"/>
+              </a:ext>
+            </a:extLst>
+          </p:cNvPr>
+          <p:cNvSpPr>
+            <a:spLocks noGrp="1"/>
+          </p:cNvSpPr>
+          <p:nvPr>
+            <p:ph type="title"/>
+          </p:nvPr>
+        </p:nvSpPr>
+        <p:spPr>
+          <a:xfrm>
+            <a:off x="762000" y="457200"/>
+            <a:ext cx="7391400" cy="538609"/>
+          </a:xfrm>
+        </p:spPr>
+        <p:txBody>
+          <a:bodyPr/>
+          <a:lstStyle/>
+          <a:p>
+            <a:r>
+              <a:rPr lang="en-GB" dirty="0">
+                <a:latin typeface="Arial Black" panose="020B0A04020102020204" pitchFamily="34" charset="0"/>
+              </a:rPr>
+              <a:t>All performance compared</a:t>
+            </a:r>
+            <a:endParaRPr lang="en-GB" noProof="0" dirty="0">
+              <a:latin typeface="Arial Black" panose="020B0A04020102020204" pitchFamily="34" charset="0"/>
+            </a:endParaRPr>
+          </a:p>
+        </p:txBody>
+      </p:sp>
+      <p:graphicFrame>
+        <p:nvGraphicFramePr>
+          <p:cNvPr id="2" name="Tabella 1">
+            <a:extLst>
+              <a:ext uri="{FF2B5EF4-FFF2-40B4-BE49-F238E27FC236}">
+                <a16:creationId xmlns:a16="http://schemas.microsoft.com/office/drawing/2014/main" id="{D76073EB-E032-0E04-2444-1F9CEBE7D22D}"/>
+              </a:ext>
+            </a:extLst>
+          </p:cNvPr>
+          <p:cNvGraphicFramePr>
+            <a:graphicFrameLocks noGrp="1"/>
+          </p:cNvGraphicFramePr>
+          <p:nvPr>
+            <p:extLst>
+              <p:ext uri="{D42A27DB-BD31-4B8C-83A1-F6EECF244321}">
+                <p14:modId xmlns:p14="http://schemas.microsoft.com/office/powerpoint/2010/main" val="818747880"/>
+              </p:ext>
+            </p:extLst>
+          </p:nvPr>
+        </p:nvGraphicFramePr>
+        <p:xfrm>
+          <a:off x="2286000" y="1371600"/>
+          <a:ext cx="7619999" cy="2209800"/>
+        </p:xfrm>
+        <a:graphic>
+          <a:graphicData uri="http://schemas.openxmlformats.org/drawingml/2006/table">
+            <a:tbl>
+              <a:tblPr firstRow="1" bandRow="1">
+                <a:tableStyleId>{5C22544A-7EE6-4342-B048-85BDC9FD1C3A}</a:tableStyleId>
+              </a:tblPr>
+              <a:tblGrid>
+                <a:gridCol w="3628571">
+                  <a:extLst>
+                    <a:ext uri="{9D8B030D-6E8A-4147-A177-3AD203B41FA5}">
+                      <a16:colId xmlns:a16="http://schemas.microsoft.com/office/drawing/2014/main" val="1976432627"/>
+                    </a:ext>
+                  </a:extLst>
+                </a:gridCol>
+                <a:gridCol w="1995714">
+                  <a:extLst>
+                    <a:ext uri="{9D8B030D-6E8A-4147-A177-3AD203B41FA5}">
+                      <a16:colId xmlns:a16="http://schemas.microsoft.com/office/drawing/2014/main" val="3349849245"/>
+                    </a:ext>
+                  </a:extLst>
+                </a:gridCol>
+                <a:gridCol w="1995714">
+                  <a:extLst>
+                    <a:ext uri="{9D8B030D-6E8A-4147-A177-3AD203B41FA5}">
+                      <a16:colId xmlns:a16="http://schemas.microsoft.com/office/drawing/2014/main" val="1757108676"/>
+                    </a:ext>
+                  </a:extLst>
+                </a:gridCol>
+              </a:tblGrid>
+              <a:tr h="625599">
+                <a:tc>
+                  <a:txBody>
+                    <a:bodyPr/>
+                    <a:lstStyle/>
+                    <a:p>
+                      <a:pPr algn="ctr"/>
+                      <a:r>
+                        <a:rPr lang="it-IT" b="1" dirty="0">
+                          <a:solidFill>
+                            <a:schemeClr val="lt1"/>
+                          </a:solidFill>
+                          <a:latin typeface="Arial" panose="020B0604020202020204" pitchFamily="34" charset="0"/>
+                          <a:ea typeface="+mn-ea"/>
+                          <a:cs typeface="Arial" panose="020B0604020202020204" pitchFamily="34" charset="0"/>
+                        </a:rPr>
+                        <a:t>Coordinate </a:t>
+                      </a:r>
+                      <a:r>
+                        <a:rPr lang="it-IT" b="1" dirty="0" err="1">
+                          <a:solidFill>
+                            <a:schemeClr val="lt1"/>
+                          </a:solidFill>
+                          <a:latin typeface="Arial" panose="020B0604020202020204" pitchFamily="34" charset="0"/>
+                          <a:ea typeface="+mn-ea"/>
+                          <a:cs typeface="Arial" panose="020B0604020202020204" pitchFamily="34" charset="0"/>
+                        </a:rPr>
+                        <a:t>Descent</a:t>
+                      </a:r>
+                      <a:r>
+                        <a:rPr lang="it-IT" b="1" dirty="0">
+                          <a:solidFill>
+                            <a:schemeClr val="lt1"/>
+                          </a:solidFill>
+                          <a:latin typeface="Arial" panose="020B0604020202020204" pitchFamily="34" charset="0"/>
+                          <a:ea typeface="+mn-ea"/>
+                          <a:cs typeface="Arial" panose="020B0604020202020204" pitchFamily="34" charset="0"/>
+                        </a:rPr>
+                        <a:t> Setting</a:t>
+                      </a:r>
+                    </a:p>
+                  </a:txBody>
+                  <a:tcPr/>
+                </a:tc>
+                <a:tc>
+                  <a:txBody>
+                    <a:bodyPr/>
+                    <a:lstStyle/>
+                    <a:p>
+                      <a:pPr algn="ctr"/>
+                      <a:r>
+                        <a:rPr lang="it-IT" b="1" dirty="0">
+                          <a:solidFill>
+                            <a:schemeClr val="lt1"/>
+                          </a:solidFill>
+                          <a:latin typeface="Arial" panose="020B0604020202020204" pitchFamily="34" charset="0"/>
+                          <a:ea typeface="+mn-ea"/>
+                          <a:cs typeface="Arial" panose="020B0604020202020204" pitchFamily="34" charset="0"/>
+                        </a:rPr>
+                        <a:t>Time </a:t>
+                      </a:r>
+                      <a:r>
+                        <a:rPr lang="it-IT" b="1" dirty="0" err="1">
+                          <a:solidFill>
+                            <a:schemeClr val="lt1"/>
+                          </a:solidFill>
+                          <a:latin typeface="Arial" panose="020B0604020202020204" pitchFamily="34" charset="0"/>
+                          <a:ea typeface="+mn-ea"/>
+                          <a:cs typeface="Arial" panose="020B0604020202020204" pitchFamily="34" charset="0"/>
+                        </a:rPr>
+                        <a:t>needed</a:t>
+                      </a:r>
+                      <a:endParaRPr lang="it-IT" b="1" dirty="0">
+                        <a:solidFill>
+                          <a:schemeClr val="lt1"/>
+                        </a:solidFill>
+                        <a:latin typeface="Arial" panose="020B0604020202020204" pitchFamily="34" charset="0"/>
+                        <a:ea typeface="+mn-ea"/>
+                        <a:cs typeface="Arial" panose="020B0604020202020204" pitchFamily="34" charset="0"/>
+                      </a:endParaRPr>
+                    </a:p>
+                  </a:txBody>
+                  <a:tcPr/>
+                </a:tc>
+                <a:tc>
+                  <a:txBody>
+                    <a:bodyPr/>
+                    <a:lstStyle/>
+                    <a:p>
+                      <a:pPr algn="ctr"/>
+                      <a:r>
+                        <a:rPr lang="it-IT" b="1" dirty="0">
+                          <a:solidFill>
+                            <a:schemeClr val="lt1"/>
+                          </a:solidFill>
+                          <a:latin typeface="Arial" panose="020B0604020202020204" pitchFamily="34" charset="0"/>
+                          <a:ea typeface="+mn-ea"/>
+                          <a:cs typeface="Arial" panose="020B0604020202020204" pitchFamily="34" charset="0"/>
+                        </a:rPr>
+                        <a:t>Steps </a:t>
+                      </a:r>
+                      <a:r>
+                        <a:rPr lang="it-IT" b="1" dirty="0" err="1">
+                          <a:solidFill>
+                            <a:schemeClr val="lt1"/>
+                          </a:solidFill>
+                          <a:latin typeface="Arial" panose="020B0604020202020204" pitchFamily="34" charset="0"/>
+                          <a:ea typeface="+mn-ea"/>
+                          <a:cs typeface="Arial" panose="020B0604020202020204" pitchFamily="34" charset="0"/>
+                        </a:rPr>
+                        <a:t>needed</a:t>
+                      </a:r>
+                      <a:endParaRPr lang="it-IT" b="1" dirty="0">
+                        <a:solidFill>
+                          <a:schemeClr val="lt1"/>
+                        </a:solidFill>
+                        <a:latin typeface="Arial" panose="020B0604020202020204" pitchFamily="34" charset="0"/>
+                        <a:ea typeface="+mn-ea"/>
+                        <a:cs typeface="Arial" panose="020B0604020202020204" pitchFamily="34" charset="0"/>
+                      </a:endParaRPr>
+                    </a:p>
+                  </a:txBody>
+                  <a:tcPr/>
+                </a:tc>
+                <a:extLst>
+                  <a:ext uri="{0D108BD9-81ED-4DB2-BD59-A6C34878D82A}">
+                    <a16:rowId xmlns:a16="http://schemas.microsoft.com/office/drawing/2014/main" val="328097347"/>
+                  </a:ext>
+                </a:extLst>
+              </a:tr>
+              <a:tr h="528067">
+                <a:tc>
+                  <a:txBody>
+                    <a:bodyPr/>
+                    <a:lstStyle/>
+                    <a:p>
+                      <a:pPr marL="0" algn="ctr"/>
+                      <a:r>
+                        <a:rPr lang="en-US" b="0" i="1" u="none" dirty="0">
+                          <a:solidFill>
+                            <a:schemeClr val="tx1"/>
+                          </a:solidFill>
+                          <a:latin typeface="Arial" panose="020B0604020202020204" pitchFamily="34" charset="0"/>
+                          <a:ea typeface="+mn-ea"/>
+                          <a:cs typeface="Arial" panose="020B0604020202020204" pitchFamily="34" charset="0"/>
+                        </a:rPr>
+                        <a:t>Random coordinate</a:t>
+                      </a:r>
+                      <a:endParaRPr lang="it-IT" b="0" i="1" u="none" dirty="0">
+                        <a:solidFill>
+                          <a:schemeClr val="tx1"/>
+                        </a:solidFill>
+                        <a:latin typeface="Arial" panose="020B0604020202020204" pitchFamily="34" charset="0"/>
+                        <a:ea typeface="+mn-ea"/>
+                        <a:cs typeface="Arial" panose="020B0604020202020204" pitchFamily="34" charset="0"/>
+                      </a:endParaRPr>
+                    </a:p>
+                  </a:txBody>
+                  <a:tcPr/>
+                </a:tc>
+                <a:tc>
+                  <a:txBody>
+                    <a:bodyPr/>
+                    <a:lstStyle/>
+                    <a:p>
+                      <a:pPr marL="0" algn="ctr"/>
+                      <a:r>
+                        <a:rPr lang="it-IT" b="0" dirty="0">
+                          <a:solidFill>
+                            <a:schemeClr val="tx1"/>
+                          </a:solidFill>
+                          <a:latin typeface="Arial" panose="020B0604020202020204" pitchFamily="34" charset="0"/>
+                          <a:ea typeface="+mn-ea"/>
+                          <a:cs typeface="Arial" panose="020B0604020202020204" pitchFamily="34" charset="0"/>
+                        </a:rPr>
+                        <a:t>8ms</a:t>
+                      </a:r>
+                    </a:p>
+                  </a:txBody>
+                  <a:tcPr/>
+                </a:tc>
+                <a:tc>
+                  <a:txBody>
+                    <a:bodyPr/>
+                    <a:lstStyle/>
+                    <a:p>
+                      <a:pPr marL="0" algn="ctr"/>
+                      <a:r>
+                        <a:rPr lang="it-IT" b="0" dirty="0">
+                          <a:solidFill>
+                            <a:schemeClr val="tx1"/>
+                          </a:solidFill>
+                          <a:latin typeface="Arial" panose="020B0604020202020204" pitchFamily="34" charset="0"/>
+                          <a:ea typeface="+mn-ea"/>
+                          <a:cs typeface="Arial" panose="020B0604020202020204" pitchFamily="34" charset="0"/>
+                        </a:rPr>
+                        <a:t>About 50</a:t>
+                      </a:r>
+                    </a:p>
+                  </a:txBody>
+                  <a:tcPr/>
+                </a:tc>
+                <a:extLst>
+                  <a:ext uri="{0D108BD9-81ED-4DB2-BD59-A6C34878D82A}">
+                    <a16:rowId xmlns:a16="http://schemas.microsoft.com/office/drawing/2014/main" val="3700825046"/>
+                  </a:ext>
+                </a:extLst>
+              </a:tr>
+              <a:tr h="528067">
+                <a:tc>
+                  <a:txBody>
+                    <a:bodyPr/>
+                    <a:lstStyle/>
+                    <a:p>
+                      <a:pPr marL="0" algn="ctr"/>
+                      <a:r>
+                        <a:rPr lang="it-IT" b="0" i="1" u="none" dirty="0" err="1">
+                          <a:solidFill>
+                            <a:schemeClr val="tx1"/>
+                          </a:solidFill>
+                          <a:latin typeface="Arial" panose="020B0604020202020204" pitchFamily="34" charset="0"/>
+                          <a:ea typeface="+mn-ea"/>
+                          <a:cs typeface="Arial" panose="020B0604020202020204" pitchFamily="34" charset="0"/>
+                        </a:rPr>
+                        <a:t>Importance</a:t>
+                      </a:r>
+                      <a:r>
+                        <a:rPr lang="it-IT" b="0" i="1" u="none" dirty="0">
+                          <a:solidFill>
+                            <a:schemeClr val="tx1"/>
+                          </a:solidFill>
+                          <a:latin typeface="Arial" panose="020B0604020202020204" pitchFamily="34" charset="0"/>
+                          <a:ea typeface="+mn-ea"/>
+                          <a:cs typeface="Arial" panose="020B0604020202020204" pitchFamily="34" charset="0"/>
+                        </a:rPr>
+                        <a:t> sampling</a:t>
+                      </a:r>
+                    </a:p>
+                  </a:txBody>
+                  <a:tcPr/>
+                </a:tc>
+                <a:tc>
+                  <a:txBody>
+                    <a:bodyPr/>
+                    <a:lstStyle/>
+                    <a:p>
+                      <a:pPr marL="0" algn="ctr"/>
+                      <a:r>
+                        <a:rPr lang="it-IT" b="0" dirty="0">
+                          <a:solidFill>
+                            <a:schemeClr val="tx1"/>
+                          </a:solidFill>
+                          <a:latin typeface="Arial" panose="020B0604020202020204" pitchFamily="34" charset="0"/>
+                          <a:ea typeface="+mn-ea"/>
+                          <a:cs typeface="Arial" panose="020B0604020202020204" pitchFamily="34" charset="0"/>
+                        </a:rPr>
+                        <a:t>12ms</a:t>
+                      </a:r>
+                    </a:p>
+                  </a:txBody>
+                  <a:tcPr/>
+                </a:tc>
+                <a:tc>
+                  <a:txBody>
+                    <a:bodyPr/>
+                    <a:lstStyle/>
+                    <a:p>
+                      <a:pPr marL="0" algn="ctr"/>
+                      <a:r>
+                        <a:rPr lang="it-IT" b="0" dirty="0">
+                          <a:solidFill>
+                            <a:schemeClr val="tx1"/>
+                          </a:solidFill>
+                          <a:latin typeface="Arial" panose="020B0604020202020204" pitchFamily="34" charset="0"/>
+                          <a:ea typeface="+mn-ea"/>
+                          <a:cs typeface="Arial" panose="020B0604020202020204" pitchFamily="34" charset="0"/>
+                        </a:rPr>
+                        <a:t>About 50</a:t>
+                      </a:r>
+                    </a:p>
+                  </a:txBody>
+                  <a:tcPr/>
+                </a:tc>
+                <a:extLst>
+                  <a:ext uri="{0D108BD9-81ED-4DB2-BD59-A6C34878D82A}">
+                    <a16:rowId xmlns:a16="http://schemas.microsoft.com/office/drawing/2014/main" val="3112259662"/>
+                  </a:ext>
+                </a:extLst>
+              </a:tr>
+              <a:tr h="528067">
+                <a:tc>
+                  <a:txBody>
+                    <a:bodyPr/>
+                    <a:lstStyle/>
+                    <a:p>
+                      <a:pPr marL="0" algn="ctr"/>
+                      <a:r>
+                        <a:rPr lang="it-IT" b="0" i="1" u="none" dirty="0" err="1">
+                          <a:solidFill>
+                            <a:schemeClr val="tx1"/>
+                          </a:solidFill>
+                          <a:latin typeface="Arial" panose="020B0604020202020204" pitchFamily="34" charset="0"/>
+                          <a:ea typeface="+mn-ea"/>
+                          <a:cs typeface="Arial" panose="020B0604020202020204" pitchFamily="34" charset="0"/>
+                        </a:rPr>
+                        <a:t>Steepest</a:t>
+                      </a:r>
+                      <a:r>
+                        <a:rPr lang="it-IT" b="0" i="1" u="none" dirty="0">
+                          <a:solidFill>
+                            <a:schemeClr val="tx1"/>
+                          </a:solidFill>
+                          <a:latin typeface="Arial" panose="020B0604020202020204" pitchFamily="34" charset="0"/>
+                          <a:ea typeface="+mn-ea"/>
+                          <a:cs typeface="Arial" panose="020B0604020202020204" pitchFamily="34" charset="0"/>
+                        </a:rPr>
+                        <a:t> coordinate</a:t>
+                      </a:r>
+                    </a:p>
+                  </a:txBody>
+                  <a:tcPr/>
+                </a:tc>
+                <a:tc>
+                  <a:txBody>
+                    <a:bodyPr/>
+                    <a:lstStyle/>
+                    <a:p>
+                      <a:pPr marL="0" algn="ctr"/>
+                      <a:r>
+                        <a:rPr lang="it-IT" b="0" dirty="0">
+                          <a:solidFill>
+                            <a:schemeClr val="tx1"/>
+                          </a:solidFill>
+                          <a:latin typeface="Arial" panose="020B0604020202020204" pitchFamily="34" charset="0"/>
+                          <a:ea typeface="+mn-ea"/>
+                          <a:cs typeface="Arial" panose="020B0604020202020204" pitchFamily="34" charset="0"/>
+                        </a:rPr>
+                        <a:t>7ms</a:t>
+                      </a:r>
+                    </a:p>
+                  </a:txBody>
+                  <a:tcPr/>
+                </a:tc>
+                <a:tc>
+                  <a:txBody>
+                    <a:bodyPr/>
+                    <a:lstStyle/>
+                    <a:p>
+                      <a:pPr marL="0" algn="ctr"/>
+                      <a:r>
+                        <a:rPr lang="it-IT" b="0" dirty="0">
+                          <a:solidFill>
+                            <a:schemeClr val="tx1"/>
+                          </a:solidFill>
+                          <a:latin typeface="Arial" panose="020B0604020202020204" pitchFamily="34" charset="0"/>
+                          <a:ea typeface="+mn-ea"/>
+                          <a:cs typeface="Arial" panose="020B0604020202020204" pitchFamily="34" charset="0"/>
+                        </a:rPr>
+                        <a:t>20</a:t>
+                      </a:r>
+                    </a:p>
+                  </a:txBody>
+                  <a:tcPr/>
+                </a:tc>
+                <a:extLst>
+                  <a:ext uri="{0D108BD9-81ED-4DB2-BD59-A6C34878D82A}">
+                    <a16:rowId xmlns:a16="http://schemas.microsoft.com/office/drawing/2014/main" val="378449603"/>
+                  </a:ext>
+                </a:extLst>
+              </a:tr>
+            </a:tbl>
+          </a:graphicData>
+        </a:graphic>
+      </p:graphicFrame>
+    </p:spTree>
+    <p:extLst>
+      <p:ext uri="{BB962C8B-B14F-4D97-AF65-F5344CB8AC3E}">
+        <p14:creationId xmlns:p14="http://schemas.microsoft.com/office/powerpoint/2010/main" val="3852013349"/>
       </p:ext>
     </p:extLst>
   </p:cSld>

</xml_diff>